<commit_message>
Update 03 Write a Test footer and slide number
Fix the slide number count on the slides
Updated the copyright on the slide footer
</commit_message>
<xml_diff>
--- a/03-writing_a_test_first.pptx
+++ b/03-writing_a_test_first.pptx
@@ -5003,7 +5003,6 @@
               <a:rPr lang="en-US" dirty="0" smtClean="0"/>
               <a:t>cookbook's default recipe.</a:t>
             </a:r>
-            <a:endParaRPr lang="en-US" dirty="0" smtClean="0"/>
           </a:p>
         </p:txBody>
       </p:sp>
@@ -5657,11 +5656,7 @@
           <a:p>
             <a:r>
               <a:rPr lang="en-US" dirty="0" smtClean="0"/>
-              <a:t>Run </a:t>
-            </a:r>
-            <a:r>
-              <a:rPr lang="en-US" dirty="0" smtClean="0"/>
-              <a:t>the</a:t>
+              <a:t>Run the</a:t>
             </a:r>
             <a:r>
               <a:rPr lang="en-US" baseline="0" dirty="0" smtClean="0"/>
@@ -6846,11 +6841,7 @@
             </a:r>
             <a:r>
               <a:rPr lang="en-US" baseline="0" dirty="0" smtClean="0"/>
-              <a:t> the platform or assist with troubleshooting your recipes they fail in perplexing ways. Right now, we are interested in writing a test so logout of the instance with the 'exit' command and we will return to the </a:t>
-            </a:r>
-            <a:r>
-              <a:rPr lang="en-US" baseline="0" dirty="0" smtClean="0"/>
-              <a:t>workstation.</a:t>
+              <a:t> the platform or assist with troubleshooting your recipes they fail in perplexing ways. Right now, we are interested in writing a test so logout of the instance with the 'exit' command and we will return to the workstation.</a:t>
             </a:r>
             <a:endParaRPr lang="en-US" dirty="0"/>
           </a:p>
@@ -10895,14 +10886,14 @@
           </a:ln>
           <a:extLst>
             <a:ext uri="{909E8E84-426E-40dd-AFC4-6F175D3DCCD1}">
-              <a14:hiddenFill xmlns:a14="http://schemas.microsoft.com/office/drawing/2010/main" xmlns="">
+              <a14:hiddenFill xmlns="" xmlns:a14="http://schemas.microsoft.com/office/drawing/2010/main">
                 <a:solidFill>
                   <a:srgbClr val="FFFFFF"/>
                 </a:solidFill>
               </a14:hiddenFill>
             </a:ext>
             <a:ext uri="{91240B29-F687-4f45-9708-019B960494DF}">
-              <a14:hiddenLine xmlns:a14="http://schemas.microsoft.com/office/drawing/2010/main" xmlns="" w="9525">
+              <a14:hiddenLine xmlns="" xmlns:a14="http://schemas.microsoft.com/office/drawing/2010/main" w="9525">
                 <a:solidFill>
                   <a:srgbClr val="000000"/>
                 </a:solidFill>
@@ -11050,14 +11041,14 @@
           </a:ln>
           <a:extLst>
             <a:ext uri="{909E8E84-426E-40dd-AFC4-6F175D3DCCD1}">
-              <a14:hiddenFill xmlns:a14="http://schemas.microsoft.com/office/drawing/2010/main" xmlns="">
+              <a14:hiddenFill xmlns="" xmlns:a14="http://schemas.microsoft.com/office/drawing/2010/main">
                 <a:solidFill>
                   <a:srgbClr val="FFFFFF"/>
                 </a:solidFill>
               </a14:hiddenFill>
             </a:ext>
             <a:ext uri="{91240B29-F687-4f45-9708-019B960494DF}">
-              <a14:hiddenLine xmlns:a14="http://schemas.microsoft.com/office/drawing/2010/main" xmlns="" w="9525">
+              <a14:hiddenLine xmlns="" xmlns:a14="http://schemas.microsoft.com/office/drawing/2010/main" w="9525">
                 <a:solidFill>
                   <a:srgbClr val="000000"/>
                 </a:solidFill>
@@ -11548,14 +11539,14 @@
           </a:ln>
           <a:extLst>
             <a:ext uri="{909E8E84-426E-40dd-AFC4-6F175D3DCCD1}">
-              <a14:hiddenFill xmlns:a14="http://schemas.microsoft.com/office/drawing/2010/main" xmlns="">
+              <a14:hiddenFill xmlns="" xmlns:a14="http://schemas.microsoft.com/office/drawing/2010/main">
                 <a:solidFill>
                   <a:srgbClr val="FFFFFF"/>
                 </a:solidFill>
               </a14:hiddenFill>
             </a:ext>
             <a:ext uri="{91240B29-F687-4f45-9708-019B960494DF}">
-              <a14:hiddenLine xmlns:a14="http://schemas.microsoft.com/office/drawing/2010/main" xmlns="" w="9525">
+              <a14:hiddenLine xmlns="" xmlns:a14="http://schemas.microsoft.com/office/drawing/2010/main" w="9525">
                 <a:solidFill>
                   <a:srgbClr val="000000"/>
                 </a:solidFill>
@@ -13004,14 +12995,14 @@
           </a:ln>
           <a:extLst>
             <a:ext uri="{909E8E84-426E-40dd-AFC4-6F175D3DCCD1}">
-              <a14:hiddenFill xmlns:a14="http://schemas.microsoft.com/office/drawing/2010/main" xmlns="">
+              <a14:hiddenFill xmlns="" xmlns:a14="http://schemas.microsoft.com/office/drawing/2010/main">
                 <a:solidFill>
                   <a:srgbClr val="FFFFFF"/>
                 </a:solidFill>
               </a14:hiddenFill>
             </a:ext>
             <a:ext uri="{91240B29-F687-4f45-9708-019B960494DF}">
-              <a14:hiddenLine xmlns:a14="http://schemas.microsoft.com/office/drawing/2010/main" xmlns="" w="9525">
+              <a14:hiddenLine xmlns="" xmlns:a14="http://schemas.microsoft.com/office/drawing/2010/main" w="9525">
                 <a:solidFill>
                   <a:srgbClr val="000000"/>
                 </a:solidFill>
@@ -14365,14 +14356,14 @@
           </a:ln>
           <a:extLst>
             <a:ext uri="{909E8E84-426E-40dd-AFC4-6F175D3DCCD1}">
-              <a14:hiddenFill xmlns:a14="http://schemas.microsoft.com/office/drawing/2010/main" xmlns="">
+              <a14:hiddenFill xmlns="" xmlns:a14="http://schemas.microsoft.com/office/drawing/2010/main">
                 <a:solidFill>
                   <a:srgbClr val="FFFFFF"/>
                 </a:solidFill>
               </a14:hiddenFill>
             </a:ext>
             <a:ext uri="{91240B29-F687-4f45-9708-019B960494DF}">
-              <a14:hiddenLine xmlns:a14="http://schemas.microsoft.com/office/drawing/2010/main" xmlns="" w="9525">
+              <a14:hiddenLine xmlns="" xmlns:a14="http://schemas.microsoft.com/office/drawing/2010/main" w="9525">
                 <a:solidFill>
                   <a:srgbClr val="000000"/>
                 </a:solidFill>
@@ -14790,14 +14781,14 @@
           </a:ln>
           <a:extLst>
             <a:ext uri="{909E8E84-426E-40dd-AFC4-6F175D3DCCD1}">
-              <a14:hiddenFill xmlns:a14="http://schemas.microsoft.com/office/drawing/2010/main" xmlns="">
+              <a14:hiddenFill xmlns="" xmlns:a14="http://schemas.microsoft.com/office/drawing/2010/main">
                 <a:solidFill>
                   <a:srgbClr val="FFFFFF"/>
                 </a:solidFill>
               </a14:hiddenFill>
             </a:ext>
             <a:ext uri="{91240B29-F687-4f45-9708-019B960494DF}">
-              <a14:hiddenLine xmlns:a14="http://schemas.microsoft.com/office/drawing/2010/main" xmlns="" w="9525">
+              <a14:hiddenLine xmlns="" xmlns:a14="http://schemas.microsoft.com/office/drawing/2010/main" w="9525">
                 <a:solidFill>
                   <a:srgbClr val="000000"/>
                 </a:solidFill>
@@ -14945,14 +14936,14 @@
           </a:ln>
           <a:extLst>
             <a:ext uri="{909E8E84-426E-40dd-AFC4-6F175D3DCCD1}">
-              <a14:hiddenFill xmlns:a14="http://schemas.microsoft.com/office/drawing/2010/main" xmlns="">
+              <a14:hiddenFill xmlns="" xmlns:a14="http://schemas.microsoft.com/office/drawing/2010/main">
                 <a:solidFill>
                   <a:srgbClr val="FFFFFF"/>
                 </a:solidFill>
               </a14:hiddenFill>
             </a:ext>
             <a:ext uri="{91240B29-F687-4f45-9708-019B960494DF}">
-              <a14:hiddenLine xmlns:a14="http://schemas.microsoft.com/office/drawing/2010/main" xmlns="" w="9525">
+              <a14:hiddenLine xmlns="" xmlns:a14="http://schemas.microsoft.com/office/drawing/2010/main" w="9525">
                 <a:solidFill>
                   <a:srgbClr val="000000"/>
                 </a:solidFill>
@@ -15438,14 +15429,14 @@
           </a:ln>
           <a:extLst>
             <a:ext uri="{909E8E84-426E-40dd-AFC4-6F175D3DCCD1}">
-              <a14:hiddenFill xmlns:a14="http://schemas.microsoft.com/office/drawing/2010/main" xmlns="">
+              <a14:hiddenFill xmlns="" xmlns:a14="http://schemas.microsoft.com/office/drawing/2010/main">
                 <a:solidFill>
                   <a:srgbClr val="FFFFFF"/>
                 </a:solidFill>
               </a14:hiddenFill>
             </a:ext>
             <a:ext uri="{91240B29-F687-4f45-9708-019B960494DF}">
-              <a14:hiddenLine xmlns:a14="http://schemas.microsoft.com/office/drawing/2010/main" xmlns="" w="9525">
+              <a14:hiddenLine xmlns="" xmlns:a14="http://schemas.microsoft.com/office/drawing/2010/main" w="9525">
                 <a:solidFill>
                   <a:srgbClr val="000000"/>
                 </a:solidFill>
@@ -16003,14 +15994,14 @@
           </a:ln>
           <a:extLst>
             <a:ext uri="{909E8E84-426E-40dd-AFC4-6F175D3DCCD1}">
-              <a14:hiddenFill xmlns:a14="http://schemas.microsoft.com/office/drawing/2010/main" xmlns="">
+              <a14:hiddenFill xmlns="" xmlns:a14="http://schemas.microsoft.com/office/drawing/2010/main">
                 <a:solidFill>
                   <a:srgbClr val="FFFFFF"/>
                 </a:solidFill>
               </a14:hiddenFill>
             </a:ext>
             <a:ext uri="{91240B29-F687-4f45-9708-019B960494DF}">
-              <a14:hiddenLine xmlns:a14="http://schemas.microsoft.com/office/drawing/2010/main" xmlns="" w="9525">
+              <a14:hiddenLine xmlns="" xmlns:a14="http://schemas.microsoft.com/office/drawing/2010/main" w="9525">
                 <a:solidFill>
                   <a:srgbClr val="000000"/>
                 </a:solidFill>
@@ -16577,14 +16568,14 @@
           </a:ln>
           <a:extLst>
             <a:ext uri="{909E8E84-426E-40dd-AFC4-6F175D3DCCD1}">
-              <a14:hiddenFill xmlns:a14="http://schemas.microsoft.com/office/drawing/2010/main" xmlns="">
+              <a14:hiddenFill xmlns="" xmlns:a14="http://schemas.microsoft.com/office/drawing/2010/main">
                 <a:solidFill>
                   <a:srgbClr val="FFFFFF"/>
                 </a:solidFill>
               </a14:hiddenFill>
             </a:ext>
             <a:ext uri="{91240B29-F687-4f45-9708-019B960494DF}">
-              <a14:hiddenLine xmlns:a14="http://schemas.microsoft.com/office/drawing/2010/main" xmlns="" w="9525">
+              <a14:hiddenLine xmlns="" xmlns:a14="http://schemas.microsoft.com/office/drawing/2010/main" w="9525">
                 <a:solidFill>
                   <a:srgbClr val="000000"/>
                 </a:solidFill>
@@ -17524,14 +17515,14 @@
           </a:ln>
           <a:extLst>
             <a:ext uri="{909E8E84-426E-40dd-AFC4-6F175D3DCCD1}">
-              <a14:hiddenFill xmlns:a14="http://schemas.microsoft.com/office/drawing/2010/main" xmlns="">
+              <a14:hiddenFill xmlns="" xmlns:a14="http://schemas.microsoft.com/office/drawing/2010/main">
                 <a:solidFill>
                   <a:srgbClr val="FFFFFF"/>
                 </a:solidFill>
               </a14:hiddenFill>
             </a:ext>
             <a:ext uri="{91240B29-F687-4f45-9708-019B960494DF}">
-              <a14:hiddenLine xmlns:a14="http://schemas.microsoft.com/office/drawing/2010/main" xmlns="" w="9525">
+              <a14:hiddenLine xmlns="" xmlns:a14="http://schemas.microsoft.com/office/drawing/2010/main" w="9525">
                 <a:solidFill>
                   <a:srgbClr val="000000"/>
                 </a:solidFill>
@@ -17611,7 +17602,7 @@
               <a:defRPr/>
             </a:pPr>
             <a:r>
-              <a:rPr lang="en-US" dirty="0">
+              <a:rPr lang="en-US">
                 <a:solidFill>
                   <a:srgbClr val="7D868C"/>
                 </a:solidFill>
@@ -17619,7 +17610,29 @@
                 <a:ea typeface="+mn-ea"/>
                 <a:cs typeface="+mn-cs"/>
               </a:rPr>
-              <a:t>©2015 Chef Software Inc</a:t>
+              <a:t>©</a:t>
+            </a:r>
+            <a:r>
+              <a:rPr lang="en-US" smtClean="0">
+                <a:solidFill>
+                  <a:srgbClr val="7D868C"/>
+                </a:solidFill>
+                <a:latin typeface="+mn-lt"/>
+                <a:ea typeface="+mn-ea"/>
+                <a:cs typeface="+mn-cs"/>
+              </a:rPr>
+              <a:t>2016 </a:t>
+            </a:r>
+            <a:r>
+              <a:rPr lang="en-US" dirty="0">
+                <a:solidFill>
+                  <a:srgbClr val="7D868C"/>
+                </a:solidFill>
+                <a:latin typeface="+mn-lt"/>
+                <a:ea typeface="+mn-ea"/>
+                <a:cs typeface="+mn-cs"/>
+              </a:rPr>
+              <a:t>Chef Software Inc</a:t>
             </a:r>
             <a:r>
               <a:rPr lang="en-US" dirty="0">
@@ -18282,14 +18295,14 @@
           </a:ln>
           <a:extLst>
             <a:ext uri="{909E8E84-426E-40dd-AFC4-6F175D3DCCD1}">
-              <a14:hiddenFill xmlns:a14="http://schemas.microsoft.com/office/drawing/2010/main" xmlns="">
+              <a14:hiddenFill xmlns="" xmlns:a14="http://schemas.microsoft.com/office/drawing/2010/main">
                 <a:solidFill>
                   <a:srgbClr val="FFFFFF"/>
                 </a:solidFill>
               </a14:hiddenFill>
             </a:ext>
             <a:ext uri="{91240B29-F687-4f45-9708-019B960494DF}">
-              <a14:hiddenLine xmlns:a14="http://schemas.microsoft.com/office/drawing/2010/main" xmlns="" w="9525">
+              <a14:hiddenLine xmlns="" xmlns:a14="http://schemas.microsoft.com/office/drawing/2010/main" w="9525">
                 <a:solidFill>
                   <a:srgbClr val="000000"/>
                 </a:solidFill>
@@ -18377,7 +18390,29 @@
                 <a:ea typeface="+mn-ea"/>
                 <a:cs typeface="+mn-cs"/>
               </a:rPr>
-              <a:t>©2015 Chef Software Inc</a:t>
+              <a:t>©</a:t>
+            </a:r>
+            <a:r>
+              <a:rPr lang="en-US" dirty="0" smtClean="0">
+                <a:solidFill>
+                  <a:srgbClr val="7D868C"/>
+                </a:solidFill>
+                <a:latin typeface="+mn-lt"/>
+                <a:ea typeface="+mn-ea"/>
+                <a:cs typeface="+mn-cs"/>
+              </a:rPr>
+              <a:t>2016 </a:t>
+            </a:r>
+            <a:r>
+              <a:rPr lang="en-US" dirty="0">
+                <a:solidFill>
+                  <a:srgbClr val="7D868C"/>
+                </a:solidFill>
+                <a:latin typeface="+mn-lt"/>
+                <a:ea typeface="+mn-ea"/>
+                <a:cs typeface="+mn-cs"/>
+              </a:rPr>
+              <a:t>Chef Software Inc</a:t>
             </a:r>
             <a:r>
               <a:rPr lang="en-US" dirty="0">
@@ -18445,10 +18480,21 @@
                 <a:ea typeface="+mn-ea"/>
                 <a:cs typeface="+mn-cs"/>
               </a:rPr>
-              <a:t>1-</a:t>
+              <a:t>3</a:t>
+            </a:r>
+            <a:r>
+              <a:rPr lang="en-US" dirty="0" smtClean="0">
+                <a:solidFill>
+                  <a:srgbClr val="7F7F7F"/>
+                </a:solidFill>
+                <a:latin typeface="+mn-lt"/>
+                <a:ea typeface="+mn-ea"/>
+                <a:cs typeface="+mn-cs"/>
+              </a:rPr>
+              <a:t>-</a:t>
             </a:r>
             <a:fld id="{F0B79B2F-E1DD-4D43-95B3-EA08C411D807}" type="slidenum">
-              <a:rPr lang="en-US">
+              <a:rPr lang="en-US" smtClean="0">
                 <a:solidFill>
                   <a:srgbClr val="7F7F7F"/>
                 </a:solidFill>
@@ -19563,15 +19609,7 @@
           <a:p>
             <a:r>
               <a:rPr lang="en-US" dirty="0" smtClean="0"/>
-              <a:t>&gt; chef generate </a:t>
-            </a:r>
-            <a:r>
-              <a:rPr lang="en-US" dirty="0" smtClean="0"/>
-              <a:t>--</a:t>
-            </a:r>
-            <a:r>
-              <a:rPr lang="en-US" dirty="0" smtClean="0"/>
-              <a:t>help</a:t>
+              <a:t>&gt; chef generate --help</a:t>
             </a:r>
             <a:endParaRPr lang="en-US" dirty="0"/>
           </a:p>
@@ -22447,7 +22485,6 @@
               <a:rPr lang="en-US" dirty="0"/>
               <a:t>This tells Test Kitchen (and Busser) which Busser runner plugin needs to be installed on the remote instance.</a:t>
             </a:r>
-            <a:endParaRPr lang="en-US" dirty="0"/>
           </a:p>
         </p:txBody>
       </p:sp>
@@ -23088,7 +23125,6 @@
               <a:rPr lang="en-US" dirty="0"/>
               <a:t>.</a:t>
             </a:r>
-            <a:endParaRPr lang="en-US" dirty="0"/>
           </a:p>
         </p:txBody>
       </p:sp>
@@ -23971,11 +24007,6 @@
               </a:rPr>
               <a:t>example groups</a:t>
             </a:r>
-            <a:endParaRPr lang="en-US" dirty="0" smtClean="0">
-              <a:solidFill>
-                <a:schemeClr val="bg1"/>
-              </a:solidFill>
-            </a:endParaRPr>
           </a:p>
         </p:txBody>
       </p:sp>
@@ -24512,11 +24543,6 @@
               </a:rPr>
               <a:t> resource</a:t>
             </a:r>
-            <a:endParaRPr lang="en-US" dirty="0" smtClean="0">
-              <a:solidFill>
-                <a:schemeClr val="bg1"/>
-              </a:solidFill>
-            </a:endParaRPr>
           </a:p>
         </p:txBody>
       </p:sp>
@@ -24917,11 +24943,6 @@
               </a:rPr>
               <a:t>attribute of resource</a:t>
             </a:r>
-            <a:endParaRPr lang="en-US" sz="2800" dirty="0" smtClean="0">
-              <a:solidFill>
-                <a:schemeClr val="bg1"/>
-              </a:solidFill>
-            </a:endParaRPr>
           </a:p>
         </p:txBody>
       </p:sp>
@@ -25118,11 +25139,6 @@
               </a:rPr>
               <a:t>expectation</a:t>
             </a:r>
-            <a:endParaRPr lang="en-US" sz="2800" dirty="0" smtClean="0">
-              <a:solidFill>
-                <a:schemeClr val="bg1"/>
-              </a:solidFill>
-            </a:endParaRPr>
           </a:p>
         </p:txBody>
       </p:sp>
@@ -27335,7 +27351,6 @@
               <a:rPr lang="en-US" dirty="0"/>
               <a:t>We define a single suite named "default".</a:t>
             </a:r>
-            <a:endParaRPr lang="en-US" dirty="0"/>
           </a:p>
         </p:txBody>
       </p:sp>
@@ -28439,13 +28454,7 @@
               <a:rPr lang="en-US" dirty="0">
                 <a:cs typeface="Courier New" panose="02070309020205020404" pitchFamily="49" charset="0"/>
               </a:rPr>
-              <a:t> </a:t>
-            </a:r>
-            <a:r>
-              <a:rPr lang="en-US" dirty="0">
-                <a:cs typeface="Courier New" panose="02070309020205020404" pitchFamily="49" charset="0"/>
-              </a:rPr>
-              <a:t>will show that matrix.</a:t>
+              <a:t> will show that matrix.</a:t>
             </a:r>
             <a:endParaRPr lang="en-US" dirty="0">
               <a:latin typeface="Courier New" panose="02070309020205020404" pitchFamily="49" charset="0"/>
@@ -29111,10 +29120,6 @@
               </a:rPr>
               <a:t>one or more instances.</a:t>
             </a:r>
-            <a:endParaRPr lang="en-US" b="1" dirty="0">
-              <a:latin typeface="Courier New" panose="02070309020205020404" pitchFamily="49" charset="0"/>
-              <a:cs typeface="Courier New" panose="02070309020205020404" pitchFamily="49" charset="0"/>
-            </a:endParaRPr>
           </a:p>
         </p:txBody>
       </p:sp>
@@ -29236,13 +29241,6 @@
               </a:rPr>
               <a:t>]</a:t>
             </a:r>
-            <a:endParaRPr lang="en-US" b="1" dirty="0">
-              <a:solidFill>
-                <a:schemeClr val="bg1"/>
-              </a:solidFill>
-              <a:latin typeface="Courier New" panose="02070309020205020404" pitchFamily="49" charset="0"/>
-              <a:cs typeface="Courier New" panose="02070309020205020404" pitchFamily="49" charset="0"/>
-            </a:endParaRPr>
           </a:p>
         </p:txBody>
       </p:sp>
@@ -29490,10 +29488,6 @@
               </a:rPr>
               <a:t>the run list to one or more instances.</a:t>
             </a:r>
-            <a:endParaRPr lang="en-US" b="1" dirty="0">
-              <a:latin typeface="Courier New" panose="02070309020205020404" pitchFamily="49" charset="0"/>
-              <a:cs typeface="Courier New" panose="02070309020205020404" pitchFamily="49" charset="0"/>
-            </a:endParaRPr>
           </a:p>
         </p:txBody>
       </p:sp>
@@ -30058,13 +30052,6 @@
               </a:rPr>
               <a:t>]</a:t>
             </a:r>
-            <a:endParaRPr lang="en-US" b="1" dirty="0">
-              <a:solidFill>
-                <a:schemeClr val="bg1"/>
-              </a:solidFill>
-              <a:latin typeface="Courier New" panose="02070309020205020404" pitchFamily="49" charset="0"/>
-              <a:cs typeface="Courier New" panose="02070309020205020404" pitchFamily="49" charset="0"/>
-            </a:endParaRPr>
           </a:p>
         </p:txBody>
       </p:sp>
@@ -30429,10 +30416,6 @@
               </a:rPr>
               <a:t>instances.</a:t>
             </a:r>
-            <a:endParaRPr lang="en-US" b="1" dirty="0">
-              <a:latin typeface="Courier New" panose="02070309020205020404" pitchFamily="49" charset="0"/>
-              <a:cs typeface="Courier New" panose="02070309020205020404" pitchFamily="49" charset="0"/>
-            </a:endParaRPr>
           </a:p>
         </p:txBody>
       </p:sp>
@@ -32984,11 +32967,6 @@
               </a:rPr>
               <a:t>kitchen failure</a:t>
             </a:r>
-            <a:endParaRPr lang="en-US" dirty="0" smtClean="0">
-              <a:solidFill>
-                <a:schemeClr val="bg1"/>
-              </a:solidFill>
-            </a:endParaRPr>
           </a:p>
         </p:txBody>
       </p:sp>

</xml_diff>

<commit_message>
Update to Writing a Test First
Some slides were being formatted incorrectly. This is a bug with copy & paste copying a new slide into and creating a new master slide.
Fixed a speaker note in the questions section
</commit_message>
<xml_diff>
--- a/03-writing_a_test_first.pptx
+++ b/03-writing_a_test_first.pptx
@@ -333,7 +333,7 @@
               <a:pPr>
                 <a:defRPr/>
               </a:pPr>
-              <a:t>2016-02-19</a:t>
+              <a:t>2016-02-21</a:t>
             </a:fld>
             <a:endParaRPr lang="en-US" dirty="0"/>
           </a:p>
@@ -516,7 +516,7 @@
               <a:pPr>
                 <a:defRPr/>
               </a:pPr>
-              <a:t>2016-02-19</a:t>
+              <a:t>2016-02-21</a:t>
             </a:fld>
             <a:endParaRPr lang="en-US" dirty="0"/>
           </a:p>
@@ -8091,19 +8091,7 @@
                 <a:ea typeface="ＭＳ Ｐゴシック" charset="0"/>
                 <a:cs typeface="Arial" panose="020B0604020202020204" pitchFamily="34" charset="0"/>
               </a:rPr>
-              <a:t> to generate a cookbook, write an integration test first, use Test Kitchen to execute that test, and then implement a solution to make </a:t>
-            </a:r>
-            <a:r>
-              <a:rPr lang="en-US" sz="1200" kern="1200" baseline="0" smtClean="0">
-                <a:solidFill>
-                  <a:schemeClr val="tx1"/>
-                </a:solidFill>
-                <a:effectLst/>
-                <a:latin typeface="Arial" panose="020B0604020202020204" pitchFamily="34" charset="0"/>
-                <a:ea typeface="ＭＳ Ｐゴシック" charset="0"/>
-                <a:cs typeface="Arial" panose="020B0604020202020204" pitchFamily="34" charset="0"/>
-              </a:rPr>
-              <a:t>that test pass.</a:t>
+              <a:t> to generate a cookbook, write an integration test first, use Test Kitchen to execute that test, and then implement a solution to make that test pass.</a:t>
             </a:r>
             <a:endParaRPr lang="en-US" sz="1200" kern="1200" dirty="0" smtClean="0">
               <a:solidFill>
@@ -9275,10 +9263,19 @@
           <a:lstStyle/>
           <a:p>
             <a:r>
-              <a:rPr lang="en-US" dirty="0" smtClean="0"/>
-              <a:t>A</a:t>
-            </a:r>
-            <a:endParaRPr lang="en-US" dirty="0"/>
+              <a:rPr lang="en-US" baseline="0" dirty="0" smtClean="0"/>
+              <a:t>Now that you participated in writing a test and then the recipe let's have a discussion.</a:t>
+            </a:r>
+          </a:p>
+          <a:p>
+            <a:endParaRPr lang="en-US" baseline="0" dirty="0" smtClean="0"/>
+          </a:p>
+          <a:p>
+            <a:r>
+              <a:rPr lang="en-US" baseline="0" dirty="0" smtClean="0"/>
+              <a:t>Instructor Note: With large groups I often find it better to have individuals turn to the individuals around them, form groups of whatever size they feel comfortable, and have them take turns asking and answering the questions. When all the groups are done I then open the discussion up to the entire group allowing each group or individuals to share their answers.</a:t>
+            </a:r>
+            <a:endParaRPr lang="en-US" dirty="0" smtClean="0"/>
           </a:p>
         </p:txBody>
       </p:sp>
@@ -9435,7 +9432,7 @@
             </a:r>
             <a:r>
               <a:rPr lang="en-US" baseline="0" dirty="0" smtClean="0"/>
-              <a:t> we complete this discussion and start learning some of these new tools and languages let us pause for questions.</a:t>
+              <a:t> we complete this section, let us pause for questions.</a:t>
             </a:r>
             <a:endParaRPr lang="en-US" dirty="0" smtClean="0"/>
           </a:p>
@@ -9589,12 +9586,24 @@
               <a:defRPr/>
             </a:pPr>
             <a:r>
-              <a:rPr lang="en-US" dirty="0" smtClean="0"/>
-              <a:t>You've</a:t>
+              <a:rPr lang="en-US" smtClean="0"/>
+              <a:t>You</a:t>
+            </a:r>
+            <a:r>
+              <a:rPr lang="en-US" baseline="0" smtClean="0"/>
+              <a:t> have </a:t>
             </a:r>
             <a:r>
               <a:rPr lang="en-US" baseline="0" dirty="0" smtClean="0"/>
-              <a:t> performed TDD. Next we are going to use the tests to help us refactor the recipe we wrote. In a series of group exercises we will explore some of the important nuances of Test Kitchen's subcommands: converge and verify. And explore another subcommand named: test.</a:t>
+              <a:t>performed </a:t>
+            </a:r>
+            <a:r>
+              <a:rPr lang="en-US" baseline="0" dirty="0" smtClean="0"/>
+              <a:t>almost all of the steps of TDD</a:t>
+            </a:r>
+            <a:r>
+              <a:rPr lang="en-US" baseline="0" dirty="0" smtClean="0"/>
+              <a:t>. Next we are going to use the tests to help us refactor the recipe we wrote. In a series of group exercises we will explore some of the important nuances of Test Kitchen's subcommands: converge and verify. And explore another subcommand named: test.</a:t>
             </a:r>
           </a:p>
         </p:txBody>
@@ -14279,1079 +14288,6 @@
   </p:cSld>
   <p:clrMapOvr>
     <a:masterClrMapping/>
-  </p:clrMapOvr>
-  <p:transition spd="med">
-    <p:fade/>
-  </p:transition>
-</p:sldLayout>
-</file>
-
-<file path=ppt/slideLayouts/slideLayout21.xml><?xml version="1.0" encoding="utf-8"?>
-<p:sldLayout xmlns:a="http://schemas.openxmlformats.org/drawingml/2006/main" xmlns:r="http://schemas.openxmlformats.org/officeDocument/2006/relationships" xmlns:p="http://schemas.openxmlformats.org/presentationml/2006/main" userDrawn="1">
-  <p:cSld name="Command - Black">
-    <p:bg>
-      <p:bgPr>
-        <a:gradFill>
-          <a:gsLst>
-            <a:gs pos="0">
-              <a:schemeClr val="bg2">
-                <a:lumMod val="95000"/>
-              </a:schemeClr>
-            </a:gs>
-            <a:gs pos="100000">
-              <a:schemeClr val="bg2"/>
-            </a:gs>
-          </a:gsLst>
-          <a:lin ang="5400000" scaled="1"/>
-        </a:gradFill>
-        <a:effectLst/>
-      </p:bgPr>
-    </p:bg>
-    <p:spTree>
-      <p:nvGrpSpPr>
-        <p:cNvPr id="1" name=""/>
-        <p:cNvGrpSpPr/>
-        <p:nvPr/>
-      </p:nvGrpSpPr>
-      <p:grpSpPr>
-        <a:xfrm>
-          <a:off x="0" y="0"/>
-          <a:ext cx="0" cy="0"/>
-          <a:chOff x="0" y="0"/>
-          <a:chExt cx="0" cy="0"/>
-        </a:xfrm>
-      </p:grpSpPr>
-      <p:pic>
-        <p:nvPicPr>
-          <p:cNvPr id="7" name="Picture 8"/>
-          <p:cNvPicPr>
-            <a:picLocks noChangeAspect="1"/>
-          </p:cNvPicPr>
-          <p:nvPr/>
-        </p:nvPicPr>
-        <p:blipFill>
-          <a:blip r:embed="rId2">
-            <a:extLst>
-              <a:ext uri="{28A0092B-C50C-407E-A947-70E740481C1C}">
-                <a14:useLocalDpi xmlns:a14="http://schemas.microsoft.com/office/drawing/2010/main" val="0"/>
-              </a:ext>
-            </a:extLst>
-          </a:blip>
-          <a:srcRect/>
-          <a:stretch>
-            <a:fillRect/>
-          </a:stretch>
-        </p:blipFill>
-        <p:spPr bwMode="auto">
-          <a:xfrm>
-            <a:off x="246063" y="1433513"/>
-            <a:ext cx="703262" cy="538162"/>
-          </a:xfrm>
-          <a:prstGeom prst="rect">
-            <a:avLst/>
-          </a:prstGeom>
-          <a:noFill/>
-          <a:ln>
-            <a:noFill/>
-          </a:ln>
-          <a:extLst>
-            <a:ext uri="{909E8E84-426E-40dd-AFC4-6F175D3DCCD1}">
-              <a14:hiddenFill xmlns="" xmlns:a14="http://schemas.microsoft.com/office/drawing/2010/main">
-                <a:solidFill>
-                  <a:srgbClr val="FFFFFF"/>
-                </a:solidFill>
-              </a14:hiddenFill>
-            </a:ext>
-            <a:ext uri="{91240B29-F687-4f45-9708-019B960494DF}">
-              <a14:hiddenLine xmlns="" xmlns:a14="http://schemas.microsoft.com/office/drawing/2010/main" w="9525">
-                <a:solidFill>
-                  <a:srgbClr val="000000"/>
-                </a:solidFill>
-                <a:miter lim="800000"/>
-                <a:headEnd/>
-                <a:tailEnd/>
-              </a14:hiddenLine>
-            </a:ext>
-          </a:extLst>
-        </p:spPr>
-      </p:pic>
-      <p:cxnSp>
-        <p:nvCxnSpPr>
-          <p:cNvPr id="8" name="Straight Connector 7"/>
-          <p:cNvCxnSpPr/>
-          <p:nvPr/>
-        </p:nvCxnSpPr>
-        <p:spPr>
-          <a:xfrm flipH="1">
-            <a:off x="0" y="8164513"/>
-            <a:ext cx="16256000" cy="36512"/>
-          </a:xfrm>
-          <a:prstGeom prst="line">
-            <a:avLst/>
-          </a:prstGeom>
-          <a:ln>
-            <a:solidFill>
-              <a:schemeClr val="accent1"/>
-            </a:solidFill>
-          </a:ln>
-        </p:spPr>
-        <p:style>
-          <a:lnRef idx="3">
-            <a:schemeClr val="accent1"/>
-          </a:lnRef>
-          <a:fillRef idx="0">
-            <a:schemeClr val="accent1"/>
-          </a:fillRef>
-          <a:effectRef idx="2">
-            <a:schemeClr val="accent1"/>
-          </a:effectRef>
-          <a:fontRef idx="minor">
-            <a:schemeClr val="tx1"/>
-          </a:fontRef>
-        </p:style>
-      </p:cxnSp>
-      <p:sp>
-        <p:nvSpPr>
-          <p:cNvPr id="16" name="Content Placeholder 3"/>
-          <p:cNvSpPr>
-            <a:spLocks noGrp="1"/>
-          </p:cNvSpPr>
-          <p:nvPr>
-            <p:ph sz="quarter" idx="10" hasCustomPrompt="1"/>
-          </p:nvPr>
-        </p:nvSpPr>
-        <p:spPr>
-          <a:xfrm>
-            <a:off x="1121104" y="2315963"/>
-            <a:ext cx="14423693" cy="5580480"/>
-          </a:xfrm>
-          <a:prstGeom prst="rect">
-            <a:avLst/>
-          </a:prstGeom>
-          <a:solidFill>
-            <a:schemeClr val="tx2"/>
-          </a:solidFill>
-          <a:ln w="12700">
-            <a:solidFill>
-              <a:schemeClr val="tx2"/>
-            </a:solidFill>
-            <a:prstDash val="dash"/>
-          </a:ln>
-        </p:spPr>
-        <p:txBody>
-          <a:bodyPr lIns="91440" tIns="45720" rIns="91440" bIns="45720">
-            <a:noAutofit/>
-          </a:bodyPr>
-          <a:lstStyle>
-            <a:lvl1pPr marL="0" marR="0" indent="0" algn="l" defTabSz="1219120" rtl="0" eaLnBrk="1" fontAlgn="auto" latinLnBrk="0" hangingPunct="1">
-              <a:lnSpc>
-                <a:spcPct val="100000"/>
-              </a:lnSpc>
-              <a:spcBef>
-                <a:spcPts val="800"/>
-              </a:spcBef>
-              <a:spcAft>
-                <a:spcPts val="0"/>
-              </a:spcAft>
-              <a:buClrTx/>
-              <a:buSzPct val="90000"/>
-              <a:buFont typeface="Arial" pitchFamily="34" charset="0"/>
-              <a:buNone/>
-              <a:tabLst/>
-              <a:defRPr sz="2800">
-                <a:solidFill>
-                  <a:srgbClr val="FFFFFF"/>
-                </a:solidFill>
-                <a:latin typeface="Courier New"/>
-                <a:cs typeface="Courier New"/>
-              </a:defRPr>
-            </a:lvl1pPr>
-            <a:lvl2pPr>
-              <a:defRPr>
-                <a:solidFill>
-                  <a:srgbClr val="FFFFFF"/>
-                </a:solidFill>
-              </a:defRPr>
-            </a:lvl2pPr>
-            <a:lvl3pPr>
-              <a:defRPr>
-                <a:solidFill>
-                  <a:srgbClr val="FFFFFF"/>
-                </a:solidFill>
-              </a:defRPr>
-            </a:lvl3pPr>
-            <a:lvl4pPr>
-              <a:defRPr>
-                <a:solidFill>
-                  <a:srgbClr val="FFFFFF"/>
-                </a:solidFill>
-              </a:defRPr>
-            </a:lvl4pPr>
-            <a:lvl5pPr>
-              <a:defRPr>
-                <a:solidFill>
-                  <a:srgbClr val="FFFFFF"/>
-                </a:solidFill>
-              </a:defRPr>
-            </a:lvl5pPr>
-          </a:lstStyle>
-          <a:p>
-            <a:pPr lvl="0"/>
-            <a:r>
-              <a:rPr lang="en-US" dirty="0" smtClean="0"/>
-              <a:t>RESULT</a:t>
-            </a:r>
-          </a:p>
-        </p:txBody>
-      </p:sp>
-      <p:sp>
-        <p:nvSpPr>
-          <p:cNvPr id="5" name="Text Placeholder 4"/>
-          <p:cNvSpPr>
-            <a:spLocks noGrp="1"/>
-          </p:cNvSpPr>
-          <p:nvPr>
-            <p:ph type="body" sz="quarter" idx="11" hasCustomPrompt="1"/>
-          </p:nvPr>
-        </p:nvSpPr>
-        <p:spPr>
-          <a:xfrm>
-            <a:off x="1121104" y="1337149"/>
-            <a:ext cx="14422528" cy="729785"/>
-          </a:xfrm>
-          <a:prstGeom prst="rect">
-            <a:avLst/>
-          </a:prstGeom>
-          <a:solidFill>
-            <a:schemeClr val="tx2"/>
-          </a:solidFill>
-        </p:spPr>
-        <p:txBody>
-          <a:bodyPr lIns="91440" anchor="ctr" anchorCtr="0">
-            <a:noAutofit/>
-          </a:bodyPr>
-          <a:lstStyle>
-            <a:lvl1pPr marL="0" indent="0">
-              <a:lnSpc>
-                <a:spcPct val="100000"/>
-              </a:lnSpc>
-              <a:buNone/>
-              <a:defRPr sz="2800" b="1">
-                <a:solidFill>
-                  <a:schemeClr val="bg1"/>
-                </a:solidFill>
-                <a:latin typeface="Courier New"/>
-                <a:cs typeface="Courier New"/>
-              </a:defRPr>
-            </a:lvl1pPr>
-          </a:lstStyle>
-          <a:p>
-            <a:pPr lvl="0"/>
-            <a:r>
-              <a:rPr lang="en-US" dirty="0" smtClean="0"/>
-              <a:t>&gt; command</a:t>
-            </a:r>
-          </a:p>
-        </p:txBody>
-      </p:sp>
-      <p:sp>
-        <p:nvSpPr>
-          <p:cNvPr id="6" name="Content Placeholder 5"/>
-          <p:cNvSpPr>
-            <a:spLocks noGrp="1"/>
-          </p:cNvSpPr>
-          <p:nvPr>
-            <p:ph sz="quarter" idx="12" hasCustomPrompt="1"/>
-          </p:nvPr>
-        </p:nvSpPr>
-        <p:spPr>
-          <a:xfrm>
-            <a:off x="1127883" y="3228515"/>
-            <a:ext cx="14420850" cy="557213"/>
-          </a:xfrm>
-          <a:prstGeom prst="rect">
-            <a:avLst/>
-          </a:prstGeom>
-          <a:solidFill>
-            <a:schemeClr val="accent1">
-              <a:alpha val="60000"/>
-            </a:schemeClr>
-          </a:solidFill>
-          <a:ln>
-            <a:solidFill>
-              <a:schemeClr val="accent1">
-                <a:lumMod val="75000"/>
-              </a:schemeClr>
-            </a:solidFill>
-          </a:ln>
-        </p:spPr>
-        <p:txBody>
-          <a:bodyPr anchor="ctr">
-            <a:noAutofit/>
-          </a:bodyPr>
-          <a:lstStyle>
-            <a:lvl1pPr algn="l">
-              <a:defRPr sz="4200" baseline="0">
-                <a:solidFill>
-                  <a:schemeClr val="bg2"/>
-                </a:solidFill>
-                <a:latin typeface="Courier New"/>
-                <a:cs typeface="Courier New"/>
-              </a:defRPr>
-            </a:lvl1pPr>
-          </a:lstStyle>
-          <a:p>
-            <a:pPr lvl="0"/>
-            <a:r>
-              <a:rPr lang="en-US" dirty="0" smtClean="0"/>
-              <a:t> </a:t>
-            </a:r>
-          </a:p>
-        </p:txBody>
-      </p:sp>
-      <p:sp>
-        <p:nvSpPr>
-          <p:cNvPr id="2" name="Title 1"/>
-          <p:cNvSpPr>
-            <a:spLocks noGrp="1"/>
-          </p:cNvSpPr>
-          <p:nvPr>
-            <p:ph type="title"/>
-          </p:nvPr>
-        </p:nvSpPr>
-        <p:spPr/>
-        <p:txBody>
-          <a:bodyPr>
-            <a:normAutofit/>
-          </a:bodyPr>
-          <a:lstStyle>
-            <a:lvl1pPr>
-              <a:defRPr sz="5870"/>
-            </a:lvl1pPr>
-          </a:lstStyle>
-          <a:p>
-            <a:r>
-              <a:rPr lang="en-US" smtClean="0"/>
-              <a:t>Click to edit Master title style</a:t>
-            </a:r>
-            <a:endParaRPr lang="en-US" dirty="0"/>
-          </a:p>
-        </p:txBody>
-      </p:sp>
-    </p:spTree>
-    <p:extLst>
-      <p:ext uri="{BB962C8B-B14F-4D97-AF65-F5344CB8AC3E}">
-        <p14:creationId xmlns:p14="http://schemas.microsoft.com/office/powerpoint/2010/main" val="135731681"/>
-      </p:ext>
-    </p:extLst>
-  </p:cSld>
-  <p:clrMapOvr>
-    <a:overrideClrMapping bg1="lt1" tx1="dk1" bg2="lt2" tx2="dk2" accent1="accent1" accent2="accent2" accent3="accent3" accent4="accent4" accent5="accent5" accent6="accent6" hlink="hlink" folHlink="folHlink"/>
-  </p:clrMapOvr>
-  <p:transition spd="med">
-    <p:fade/>
-  </p:transition>
-</p:sldLayout>
-</file>
-
-<file path=ppt/slideLayouts/slideLayout22.xml><?xml version="1.0" encoding="utf-8"?>
-<p:sldLayout xmlns:a="http://schemas.openxmlformats.org/drawingml/2006/main" xmlns:r="http://schemas.openxmlformats.org/officeDocument/2006/relationships" xmlns:p="http://schemas.openxmlformats.org/presentationml/2006/main" userDrawn="1">
-  <p:cSld name="Comparison">
-    <p:bg>
-      <p:bgPr>
-        <a:gradFill>
-          <a:gsLst>
-            <a:gs pos="0">
-              <a:schemeClr val="bg2">
-                <a:lumMod val="95000"/>
-              </a:schemeClr>
-            </a:gs>
-            <a:gs pos="100000">
-              <a:schemeClr val="bg2"/>
-            </a:gs>
-          </a:gsLst>
-          <a:lin ang="5400000" scaled="1"/>
-        </a:gradFill>
-        <a:effectLst/>
-      </p:bgPr>
-    </p:bg>
-    <p:spTree>
-      <p:nvGrpSpPr>
-        <p:cNvPr id="1" name=""/>
-        <p:cNvGrpSpPr/>
-        <p:nvPr/>
-      </p:nvGrpSpPr>
-      <p:grpSpPr>
-        <a:xfrm>
-          <a:off x="0" y="0"/>
-          <a:ext cx="0" cy="0"/>
-          <a:chOff x="0" y="0"/>
-          <a:chExt cx="0" cy="0"/>
-        </a:xfrm>
-      </p:grpSpPr>
-      <p:sp>
-        <p:nvSpPr>
-          <p:cNvPr id="6" name="Rectangle 5"/>
-          <p:cNvSpPr/>
-          <p:nvPr/>
-        </p:nvSpPr>
-        <p:spPr bwMode="auto">
-          <a:xfrm>
-            <a:off x="0" y="0"/>
-            <a:ext cx="8089900" cy="9144000"/>
-          </a:xfrm>
-          <a:prstGeom prst="rect">
-            <a:avLst/>
-          </a:prstGeom>
-          <a:solidFill>
-            <a:schemeClr val="bg1">
-              <a:lumMod val="85000"/>
-              <a:alpha val="25000"/>
-            </a:schemeClr>
-          </a:solidFill>
-          <a:ln>
-            <a:noFill/>
-            <a:headEnd type="none" w="med" len="med"/>
-            <a:tailEnd type="none" w="med" len="med"/>
-          </a:ln>
-          <a:effectLst/>
-        </p:spPr>
-        <p:style>
-          <a:lnRef idx="1">
-            <a:schemeClr val="accent4"/>
-          </a:lnRef>
-          <a:fillRef idx="3">
-            <a:schemeClr val="accent4"/>
-          </a:fillRef>
-          <a:effectRef idx="2">
-            <a:schemeClr val="accent4"/>
-          </a:effectRef>
-          <a:fontRef idx="minor">
-            <a:schemeClr val="lt1"/>
-          </a:fontRef>
-        </p:style>
-        <p:txBody>
-          <a:bodyPr lIns="121915" tIns="60957" rIns="121915" bIns="60957" anchor="ctr"/>
-          <a:lstStyle/>
-          <a:p>
-            <a:pPr algn="ctr" defTabSz="1218768" fontAlgn="auto">
-              <a:spcBef>
-                <a:spcPts val="0"/>
-              </a:spcBef>
-              <a:spcAft>
-                <a:spcPts val="0"/>
-              </a:spcAft>
-              <a:defRPr/>
-            </a:pPr>
-            <a:endParaRPr lang="en-US" sz="3200" dirty="0">
-              <a:gradFill>
-                <a:gsLst>
-                  <a:gs pos="0">
-                    <a:srgbClr val="FFFFFF"/>
-                  </a:gs>
-                  <a:gs pos="100000">
-                    <a:srgbClr val="FFFFFF"/>
-                  </a:gs>
-                </a:gsLst>
-                <a:lin ang="5400000" scaled="0"/>
-              </a:gradFill>
-            </a:endParaRPr>
-          </a:p>
-        </p:txBody>
-      </p:sp>
-      <p:sp>
-        <p:nvSpPr>
-          <p:cNvPr id="8" name="TextBox 9"/>
-          <p:cNvSpPr txBox="1">
-            <a:spLocks noChangeArrowheads="1"/>
-          </p:cNvSpPr>
-          <p:nvPr/>
-        </p:nvSpPr>
-        <p:spPr bwMode="white">
-          <a:xfrm>
-            <a:off x="5602288" y="554038"/>
-            <a:ext cx="1219200" cy="1219200"/>
-          </a:xfrm>
-          <a:prstGeom prst="rect">
-            <a:avLst/>
-          </a:prstGeom>
-          <a:noFill/>
-          <a:ln>
-            <a:noFill/>
-          </a:ln>
-          <a:extLst>
-            <a:ext uri="{909E8E84-426E-40dd-AFC4-6F175D3DCCD1}">
-              <a14:hiddenFill xmlns="" xmlns:a14="http://schemas.microsoft.com/office/drawing/2010/main">
-                <a:solidFill>
-                  <a:srgbClr val="FFFFFF"/>
-                </a:solidFill>
-              </a14:hiddenFill>
-            </a:ext>
-            <a:ext uri="{91240B29-F687-4f45-9708-019B960494DF}">
-              <a14:hiddenLine xmlns="" xmlns:a14="http://schemas.microsoft.com/office/drawing/2010/main" w="9525">
-                <a:solidFill>
-                  <a:srgbClr val="000000"/>
-                </a:solidFill>
-                <a:miter lim="800000"/>
-                <a:headEnd/>
-                <a:tailEnd/>
-              </a14:hiddenLine>
-            </a:ext>
-          </a:extLst>
-        </p:spPr>
-        <p:txBody>
-          <a:bodyPr wrap="none" lIns="121920" tIns="121920" rIns="121920" bIns="121920"/>
-          <a:lstStyle>
-            <a:lvl1pPr>
-              <a:defRPr sz="2400">
-                <a:solidFill>
-                  <a:schemeClr val="tx1"/>
-                </a:solidFill>
-                <a:latin typeface="Arial" charset="0"/>
-                <a:ea typeface="ＭＳ Ｐゴシック" charset="0"/>
-                <a:cs typeface="ＭＳ Ｐゴシック" charset="0"/>
-              </a:defRPr>
-            </a:lvl1pPr>
-            <a:lvl2pPr marL="742950" indent="-285750">
-              <a:defRPr sz="2400">
-                <a:solidFill>
-                  <a:schemeClr val="tx1"/>
-                </a:solidFill>
-                <a:latin typeface="Arial" charset="0"/>
-                <a:ea typeface="ＭＳ Ｐゴシック" charset="0"/>
-              </a:defRPr>
-            </a:lvl2pPr>
-            <a:lvl3pPr marL="1143000" indent="-228600">
-              <a:defRPr sz="2400">
-                <a:solidFill>
-                  <a:schemeClr val="tx1"/>
-                </a:solidFill>
-                <a:latin typeface="Arial" charset="0"/>
-                <a:ea typeface="ＭＳ Ｐゴシック" charset="0"/>
-              </a:defRPr>
-            </a:lvl3pPr>
-            <a:lvl4pPr marL="1600200" indent="-228600">
-              <a:defRPr sz="2400">
-                <a:solidFill>
-                  <a:schemeClr val="tx1"/>
-                </a:solidFill>
-                <a:latin typeface="Arial" charset="0"/>
-                <a:ea typeface="ＭＳ Ｐゴシック" charset="0"/>
-              </a:defRPr>
-            </a:lvl4pPr>
-            <a:lvl5pPr marL="2057400" indent="-228600">
-              <a:defRPr sz="2400">
-                <a:solidFill>
-                  <a:schemeClr val="tx1"/>
-                </a:solidFill>
-                <a:latin typeface="Arial" charset="0"/>
-                <a:ea typeface="ＭＳ Ｐゴシック" charset="0"/>
-              </a:defRPr>
-            </a:lvl5pPr>
-            <a:lvl6pPr marL="2514600" indent="-228600" defTabSz="1217613" fontAlgn="base">
-              <a:spcBef>
-                <a:spcPct val="0"/>
-              </a:spcBef>
-              <a:spcAft>
-                <a:spcPct val="0"/>
-              </a:spcAft>
-              <a:defRPr sz="2400">
-                <a:solidFill>
-                  <a:schemeClr val="tx1"/>
-                </a:solidFill>
-                <a:latin typeface="Arial" charset="0"/>
-                <a:ea typeface="ＭＳ Ｐゴシック" charset="0"/>
-              </a:defRPr>
-            </a:lvl6pPr>
-            <a:lvl7pPr marL="2971800" indent="-228600" defTabSz="1217613" fontAlgn="base">
-              <a:spcBef>
-                <a:spcPct val="0"/>
-              </a:spcBef>
-              <a:spcAft>
-                <a:spcPct val="0"/>
-              </a:spcAft>
-              <a:defRPr sz="2400">
-                <a:solidFill>
-                  <a:schemeClr val="tx1"/>
-                </a:solidFill>
-                <a:latin typeface="Arial" charset="0"/>
-                <a:ea typeface="ＭＳ Ｐゴシック" charset="0"/>
-              </a:defRPr>
-            </a:lvl7pPr>
-            <a:lvl8pPr marL="3429000" indent="-228600" defTabSz="1217613" fontAlgn="base">
-              <a:spcBef>
-                <a:spcPct val="0"/>
-              </a:spcBef>
-              <a:spcAft>
-                <a:spcPct val="0"/>
-              </a:spcAft>
-              <a:defRPr sz="2400">
-                <a:solidFill>
-                  <a:schemeClr val="tx1"/>
-                </a:solidFill>
-                <a:latin typeface="Arial" charset="0"/>
-                <a:ea typeface="ＭＳ Ｐゴシック" charset="0"/>
-              </a:defRPr>
-            </a:lvl8pPr>
-            <a:lvl9pPr marL="3886200" indent="-228600" defTabSz="1217613" fontAlgn="base">
-              <a:spcBef>
-                <a:spcPct val="0"/>
-              </a:spcBef>
-              <a:spcAft>
-                <a:spcPct val="0"/>
-              </a:spcAft>
-              <a:defRPr sz="2400">
-                <a:solidFill>
-                  <a:schemeClr val="tx1"/>
-                </a:solidFill>
-                <a:latin typeface="Arial" charset="0"/>
-                <a:ea typeface="ＭＳ Ｐゴシック" charset="0"/>
-              </a:defRPr>
-            </a:lvl9pPr>
-          </a:lstStyle>
-          <a:p>
-            <a:endParaRPr lang="en-US" sz="3200"/>
-          </a:p>
-        </p:txBody>
-      </p:sp>
-      <p:sp>
-        <p:nvSpPr>
-          <p:cNvPr id="10" name="TextBox 10"/>
-          <p:cNvSpPr txBox="1">
-            <a:spLocks noChangeArrowheads="1"/>
-          </p:cNvSpPr>
-          <p:nvPr/>
-        </p:nvSpPr>
-        <p:spPr bwMode="white">
-          <a:xfrm>
-            <a:off x="8610600" y="530225"/>
-            <a:ext cx="1219200" cy="1219200"/>
-          </a:xfrm>
-          <a:prstGeom prst="rect">
-            <a:avLst/>
-          </a:prstGeom>
-          <a:noFill/>
-          <a:ln>
-            <a:noFill/>
-          </a:ln>
-          <a:extLst>
-            <a:ext uri="{909E8E84-426E-40dd-AFC4-6F175D3DCCD1}">
-              <a14:hiddenFill xmlns="" xmlns:a14="http://schemas.microsoft.com/office/drawing/2010/main">
-                <a:solidFill>
-                  <a:srgbClr val="FFFFFF"/>
-                </a:solidFill>
-              </a14:hiddenFill>
-            </a:ext>
-            <a:ext uri="{91240B29-F687-4f45-9708-019B960494DF}">
-              <a14:hiddenLine xmlns="" xmlns:a14="http://schemas.microsoft.com/office/drawing/2010/main" w="9525">
-                <a:solidFill>
-                  <a:srgbClr val="000000"/>
-                </a:solidFill>
-                <a:miter lim="800000"/>
-                <a:headEnd/>
-                <a:tailEnd/>
-              </a14:hiddenLine>
-            </a:ext>
-          </a:extLst>
-        </p:spPr>
-        <p:txBody>
-          <a:bodyPr wrap="none" lIns="121920" tIns="121920" rIns="121920" bIns="121920"/>
-          <a:lstStyle>
-            <a:lvl1pPr>
-              <a:defRPr sz="2400">
-                <a:solidFill>
-                  <a:schemeClr val="tx1"/>
-                </a:solidFill>
-                <a:latin typeface="Arial" charset="0"/>
-                <a:ea typeface="ＭＳ Ｐゴシック" charset="0"/>
-                <a:cs typeface="ＭＳ Ｐゴシック" charset="0"/>
-              </a:defRPr>
-            </a:lvl1pPr>
-            <a:lvl2pPr marL="742950" indent="-285750">
-              <a:defRPr sz="2400">
-                <a:solidFill>
-                  <a:schemeClr val="tx1"/>
-                </a:solidFill>
-                <a:latin typeface="Arial" charset="0"/>
-                <a:ea typeface="ＭＳ Ｐゴシック" charset="0"/>
-              </a:defRPr>
-            </a:lvl2pPr>
-            <a:lvl3pPr marL="1143000" indent="-228600">
-              <a:defRPr sz="2400">
-                <a:solidFill>
-                  <a:schemeClr val="tx1"/>
-                </a:solidFill>
-                <a:latin typeface="Arial" charset="0"/>
-                <a:ea typeface="ＭＳ Ｐゴシック" charset="0"/>
-              </a:defRPr>
-            </a:lvl3pPr>
-            <a:lvl4pPr marL="1600200" indent="-228600">
-              <a:defRPr sz="2400">
-                <a:solidFill>
-                  <a:schemeClr val="tx1"/>
-                </a:solidFill>
-                <a:latin typeface="Arial" charset="0"/>
-                <a:ea typeface="ＭＳ Ｐゴシック" charset="0"/>
-              </a:defRPr>
-            </a:lvl4pPr>
-            <a:lvl5pPr marL="2057400" indent="-228600">
-              <a:defRPr sz="2400">
-                <a:solidFill>
-                  <a:schemeClr val="tx1"/>
-                </a:solidFill>
-                <a:latin typeface="Arial" charset="0"/>
-                <a:ea typeface="ＭＳ Ｐゴシック" charset="0"/>
-              </a:defRPr>
-            </a:lvl5pPr>
-            <a:lvl6pPr marL="2514600" indent="-228600" defTabSz="1217613" fontAlgn="base">
-              <a:spcBef>
-                <a:spcPct val="0"/>
-              </a:spcBef>
-              <a:spcAft>
-                <a:spcPct val="0"/>
-              </a:spcAft>
-              <a:defRPr sz="2400">
-                <a:solidFill>
-                  <a:schemeClr val="tx1"/>
-                </a:solidFill>
-                <a:latin typeface="Arial" charset="0"/>
-                <a:ea typeface="ＭＳ Ｐゴシック" charset="0"/>
-              </a:defRPr>
-            </a:lvl6pPr>
-            <a:lvl7pPr marL="2971800" indent="-228600" defTabSz="1217613" fontAlgn="base">
-              <a:spcBef>
-                <a:spcPct val="0"/>
-              </a:spcBef>
-              <a:spcAft>
-                <a:spcPct val="0"/>
-              </a:spcAft>
-              <a:defRPr sz="2400">
-                <a:solidFill>
-                  <a:schemeClr val="tx1"/>
-                </a:solidFill>
-                <a:latin typeface="Arial" charset="0"/>
-                <a:ea typeface="ＭＳ Ｐゴシック" charset="0"/>
-              </a:defRPr>
-            </a:lvl7pPr>
-            <a:lvl8pPr marL="3429000" indent="-228600" defTabSz="1217613" fontAlgn="base">
-              <a:spcBef>
-                <a:spcPct val="0"/>
-              </a:spcBef>
-              <a:spcAft>
-                <a:spcPct val="0"/>
-              </a:spcAft>
-              <a:defRPr sz="2400">
-                <a:solidFill>
-                  <a:schemeClr val="tx1"/>
-                </a:solidFill>
-                <a:latin typeface="Arial" charset="0"/>
-                <a:ea typeface="ＭＳ Ｐゴシック" charset="0"/>
-              </a:defRPr>
-            </a:lvl8pPr>
-            <a:lvl9pPr marL="3886200" indent="-228600" defTabSz="1217613" fontAlgn="base">
-              <a:spcBef>
-                <a:spcPct val="0"/>
-              </a:spcBef>
-              <a:spcAft>
-                <a:spcPct val="0"/>
-              </a:spcAft>
-              <a:defRPr sz="2400">
-                <a:solidFill>
-                  <a:schemeClr val="tx1"/>
-                </a:solidFill>
-                <a:latin typeface="Arial" charset="0"/>
-                <a:ea typeface="ＭＳ Ｐゴシック" charset="0"/>
-              </a:defRPr>
-            </a:lvl9pPr>
-          </a:lstStyle>
-          <a:p>
-            <a:endParaRPr lang="en-US" sz="3200"/>
-          </a:p>
-        </p:txBody>
-      </p:sp>
-      <p:cxnSp>
-        <p:nvCxnSpPr>
-          <p:cNvPr id="11" name="Straight Connector 10"/>
-          <p:cNvCxnSpPr/>
-          <p:nvPr/>
-        </p:nvCxnSpPr>
-        <p:spPr>
-          <a:xfrm flipV="1">
-            <a:off x="617538" y="1171575"/>
-            <a:ext cx="7312025" cy="9525"/>
-          </a:xfrm>
-          <a:prstGeom prst="line">
-            <a:avLst/>
-          </a:prstGeom>
-          <a:effectLst/>
-        </p:spPr>
-        <p:style>
-          <a:lnRef idx="2">
-            <a:schemeClr val="accent1"/>
-          </a:lnRef>
-          <a:fillRef idx="0">
-            <a:schemeClr val="accent1"/>
-          </a:fillRef>
-          <a:effectRef idx="1">
-            <a:schemeClr val="accent1"/>
-          </a:effectRef>
-          <a:fontRef idx="minor">
-            <a:schemeClr val="tx1"/>
-          </a:fontRef>
-        </p:style>
-      </p:cxnSp>
-      <p:cxnSp>
-        <p:nvCxnSpPr>
-          <p:cNvPr id="12" name="Straight Connector 11"/>
-          <p:cNvCxnSpPr/>
-          <p:nvPr/>
-        </p:nvCxnSpPr>
-        <p:spPr>
-          <a:xfrm flipV="1">
-            <a:off x="8235950" y="1179513"/>
-            <a:ext cx="7308850" cy="1587"/>
-          </a:xfrm>
-          <a:prstGeom prst="line">
-            <a:avLst/>
-          </a:prstGeom>
-          <a:effectLst/>
-        </p:spPr>
-        <p:style>
-          <a:lnRef idx="2">
-            <a:schemeClr val="accent1"/>
-          </a:lnRef>
-          <a:fillRef idx="0">
-            <a:schemeClr val="accent1"/>
-          </a:fillRef>
-          <a:effectRef idx="1">
-            <a:schemeClr val="accent1"/>
-          </a:effectRef>
-          <a:fontRef idx="minor">
-            <a:schemeClr val="tx1"/>
-          </a:fontRef>
-        </p:style>
-      </p:cxnSp>
-      <p:sp>
-        <p:nvSpPr>
-          <p:cNvPr id="7" name="Content Placeholder 5"/>
-          <p:cNvSpPr>
-            <a:spLocks noGrp="1"/>
-          </p:cNvSpPr>
-          <p:nvPr>
-            <p:ph sz="quarter" idx="14"/>
-          </p:nvPr>
-        </p:nvSpPr>
-        <p:spPr>
-          <a:xfrm>
-            <a:off x="612485" y="1358867"/>
-            <a:ext cx="7310968" cy="6667827"/>
-          </a:xfrm>
-          <a:prstGeom prst="rect">
-            <a:avLst/>
-          </a:prstGeom>
-        </p:spPr>
-        <p:txBody>
-          <a:bodyPr lIns="91440" tIns="91440">
-            <a:normAutofit/>
-          </a:bodyPr>
-          <a:lstStyle>
-            <a:lvl1pPr>
-              <a:defRPr sz="3200"/>
-            </a:lvl1pPr>
-            <a:lvl2pPr>
-              <a:defRPr sz="2800"/>
-            </a:lvl2pPr>
-            <a:lvl3pPr>
-              <a:defRPr sz="2400"/>
-            </a:lvl3pPr>
-            <a:lvl4pPr>
-              <a:defRPr sz="3200"/>
-            </a:lvl4pPr>
-            <a:lvl5pPr>
-              <a:defRPr sz="3200"/>
-            </a:lvl5pPr>
-          </a:lstStyle>
-          <a:p>
-            <a:pPr lvl="0"/>
-            <a:r>
-              <a:rPr lang="en-US" smtClean="0"/>
-              <a:t>Click to edit Master text styles</a:t>
-            </a:r>
-          </a:p>
-          <a:p>
-            <a:pPr lvl="1"/>
-            <a:r>
-              <a:rPr lang="en-US" smtClean="0"/>
-              <a:t>Second level</a:t>
-            </a:r>
-          </a:p>
-          <a:p>
-            <a:pPr lvl="2"/>
-            <a:r>
-              <a:rPr lang="en-US" smtClean="0"/>
-              <a:t>Third level</a:t>
-            </a:r>
-          </a:p>
-        </p:txBody>
-      </p:sp>
-      <p:sp>
-        <p:nvSpPr>
-          <p:cNvPr id="9" name="Content Placeholder 5"/>
-          <p:cNvSpPr>
-            <a:spLocks noGrp="1"/>
-          </p:cNvSpPr>
-          <p:nvPr>
-            <p:ph sz="quarter" idx="12"/>
-          </p:nvPr>
-        </p:nvSpPr>
-        <p:spPr>
-          <a:xfrm>
-            <a:off x="8233833" y="1348277"/>
-            <a:ext cx="7310968" cy="6662136"/>
-          </a:xfrm>
-          <a:prstGeom prst="rect">
-            <a:avLst/>
-          </a:prstGeom>
-        </p:spPr>
-        <p:txBody>
-          <a:bodyPr lIns="91440" tIns="91440">
-            <a:normAutofit/>
-          </a:bodyPr>
-          <a:lstStyle>
-            <a:lvl1pPr>
-              <a:defRPr sz="3200"/>
-            </a:lvl1pPr>
-            <a:lvl2pPr>
-              <a:defRPr sz="2800"/>
-            </a:lvl2pPr>
-            <a:lvl3pPr>
-              <a:defRPr sz="2400"/>
-            </a:lvl3pPr>
-            <a:lvl4pPr>
-              <a:defRPr sz="3200"/>
-            </a:lvl4pPr>
-            <a:lvl5pPr>
-              <a:defRPr sz="3200"/>
-            </a:lvl5pPr>
-          </a:lstStyle>
-          <a:p>
-            <a:pPr lvl="0"/>
-            <a:r>
-              <a:rPr lang="en-US" smtClean="0"/>
-              <a:t>Click to edit Master text styles</a:t>
-            </a:r>
-          </a:p>
-          <a:p>
-            <a:pPr lvl="1"/>
-            <a:r>
-              <a:rPr lang="en-US" smtClean="0"/>
-              <a:t>Second level</a:t>
-            </a:r>
-          </a:p>
-          <a:p>
-            <a:pPr lvl="2"/>
-            <a:r>
-              <a:rPr lang="en-US" smtClean="0"/>
-              <a:t>Third level</a:t>
-            </a:r>
-          </a:p>
-        </p:txBody>
-      </p:sp>
-      <p:sp>
-        <p:nvSpPr>
-          <p:cNvPr id="15" name="Text Placeholder 14"/>
-          <p:cNvSpPr>
-            <a:spLocks noGrp="1"/>
-          </p:cNvSpPr>
-          <p:nvPr>
-            <p:ph type="body" sz="quarter" idx="15" hasCustomPrompt="1"/>
-          </p:nvPr>
-        </p:nvSpPr>
-        <p:spPr>
-          <a:xfrm>
-            <a:off x="593330" y="268017"/>
-            <a:ext cx="7376583" cy="836083"/>
-          </a:xfrm>
-          <a:prstGeom prst="rect">
-            <a:avLst/>
-          </a:prstGeom>
-        </p:spPr>
-        <p:txBody>
-          <a:bodyPr anchor="ctr">
-            <a:noAutofit/>
-          </a:bodyPr>
-          <a:lstStyle>
-            <a:lvl1pPr marL="0" indent="0" algn="ctr">
-              <a:buFontTx/>
-              <a:buNone/>
-              <a:defRPr sz="5867" b="1" i="0" baseline="0">
-                <a:solidFill>
-                  <a:schemeClr val="accent1"/>
-                </a:solidFill>
-              </a:defRPr>
-            </a:lvl1pPr>
-          </a:lstStyle>
-          <a:p>
-            <a:pPr lvl="0"/>
-            <a:r>
-              <a:rPr lang="en-US" dirty="0" smtClean="0"/>
-              <a:t>A</a:t>
-            </a:r>
-          </a:p>
-        </p:txBody>
-      </p:sp>
-      <p:sp>
-        <p:nvSpPr>
-          <p:cNvPr id="19" name="Text Placeholder 14"/>
-          <p:cNvSpPr>
-            <a:spLocks noGrp="1"/>
-          </p:cNvSpPr>
-          <p:nvPr>
-            <p:ph type="body" sz="quarter" idx="16" hasCustomPrompt="1"/>
-          </p:nvPr>
-        </p:nvSpPr>
-        <p:spPr>
-          <a:xfrm>
-            <a:off x="8204722" y="259541"/>
-            <a:ext cx="7376583" cy="836083"/>
-          </a:xfrm>
-          <a:prstGeom prst="rect">
-            <a:avLst/>
-          </a:prstGeom>
-        </p:spPr>
-        <p:txBody>
-          <a:bodyPr anchor="ctr">
-            <a:noAutofit/>
-          </a:bodyPr>
-          <a:lstStyle>
-            <a:lvl1pPr marL="0" indent="0" algn="ctr">
-              <a:buFontTx/>
-              <a:buNone/>
-              <a:defRPr sz="5867" b="1" i="0" baseline="0">
-                <a:solidFill>
-                  <a:schemeClr val="accent1"/>
-                </a:solidFill>
-              </a:defRPr>
-            </a:lvl1pPr>
-          </a:lstStyle>
-          <a:p>
-            <a:pPr lvl="0"/>
-            <a:r>
-              <a:rPr lang="en-US" dirty="0" smtClean="0"/>
-              <a:t>B</a:t>
-            </a:r>
-          </a:p>
-        </p:txBody>
-      </p:sp>
-    </p:spTree>
-    <p:extLst>
-      <p:ext uri="{BB962C8B-B14F-4D97-AF65-F5344CB8AC3E}">
-        <p14:creationId xmlns:p14="http://schemas.microsoft.com/office/powerpoint/2010/main" val="1973906561"/>
-      </p:ext>
-    </p:extLst>
-  </p:cSld>
-  <p:clrMapOvr>
-    <a:overrideClrMapping bg1="lt1" tx1="dk1" bg2="lt2" tx2="dk2" accent1="accent1" accent2="accent2" accent3="accent3" accent4="accent4" accent5="accent5" accent6="accent6" hlink="hlink" folHlink="folHlink"/>
   </p:clrMapOvr>
   <p:transition spd="med">
     <p:fade/>
@@ -18269,7 +17205,7 @@
           <p:nvPr/>
         </p:nvPicPr>
         <p:blipFill>
-          <a:blip r:embed="rId12">
+          <a:blip r:embed="rId10">
             <a:extLst>
               <a:ext uri="{28A0092B-C50C-407E-A947-70E740481C1C}">
                 <a14:useLocalDpi xmlns:a14="http://schemas.microsoft.com/office/drawing/2010/main" val="0"/>
@@ -18611,8 +17547,6 @@
     <p:sldLayoutId id="2147483855" r:id="rId6"/>
     <p:sldLayoutId id="2147483856" r:id="rId7"/>
     <p:sldLayoutId id="2147483866" r:id="rId8"/>
-    <p:sldLayoutId id="2147483867" r:id="rId9"/>
-    <p:sldLayoutId id="2147483868" r:id="rId10"/>
   </p:sldLayoutIdLst>
   <p:transition spd="med">
     <p:fade/>
@@ -19078,8 +18012,12 @@
           <a:lstStyle/>
           <a:p>
             <a:r>
+              <a:rPr lang="en-US" smtClean="0"/>
+              <a:t>Writing </a:t>
+            </a:r>
+            <a:r>
               <a:rPr lang="en-US" dirty="0" smtClean="0"/>
-              <a:t>Writing a Test First</a:t>
+              <a:t>a Test First</a:t>
             </a:r>
             <a:endParaRPr lang="en-US" dirty="0"/>
           </a:p>
@@ -22385,12 +21323,22 @@
               <a:buAutoNum type="arabicPeriod"/>
             </a:pPr>
             <a:r>
-              <a:rPr lang="en-US" dirty="0"/>
-              <a:t>F</a:t>
-            </a:r>
-            <a:r>
               <a:rPr lang="en-US" dirty="0" smtClean="0"/>
-              <a:t>inally verify that the implementation of the unit makes the tests succeed.</a:t>
+              <a:t>Finally verify that the implementation of the unit makes the tests </a:t>
+            </a:r>
+            <a:r>
+              <a:rPr lang="en-US" smtClean="0"/>
+              <a:t>succeed.</a:t>
+            </a:r>
+          </a:p>
+          <a:p>
+            <a:pPr marL="514350" indent="-514350">
+              <a:buFont typeface="+mj-lt"/>
+              <a:buAutoNum type="arabicPeriod"/>
+            </a:pPr>
+            <a:r>
+              <a:rPr lang="en-US" smtClean="0"/>
+              <a:t>Refactor</a:t>
             </a:r>
             <a:endParaRPr lang="en-US" dirty="0"/>
           </a:p>
@@ -37797,7 +36745,7 @@
       </p:sp>
       <p:sp>
         <p:nvSpPr>
-          <p:cNvPr id="4" name="Content Placeholder 3"/>
+          <p:cNvPr id="7" name="Content Placeholder 6"/>
           <p:cNvSpPr>
             <a:spLocks noGrp="1"/>
           </p:cNvSpPr>
@@ -37807,15 +36755,15 @@
         </p:nvSpPr>
         <p:spPr>
           <a:xfrm>
-            <a:off x="1127883" y="3941542"/>
-            <a:ext cx="14420850" cy="3954901"/>
+            <a:off x="1127883" y="3865330"/>
+            <a:ext cx="14420850" cy="4031113"/>
           </a:xfrm>
         </p:spPr>
         <p:txBody>
           <a:bodyPr/>
           <a:lstStyle/>
           <a:p>
-            <a:endParaRPr lang="en-US" dirty="0"/>
+            <a:endParaRPr lang="en-US"/>
           </a:p>
         </p:txBody>
       </p:sp>
@@ -38138,7 +37086,7 @@
       </p:sp>
       <p:sp>
         <p:nvSpPr>
-          <p:cNvPr id="4" name="Content Placeholder 3"/>
+          <p:cNvPr id="6" name="Content Placeholder 5"/>
           <p:cNvSpPr>
             <a:spLocks noGrp="1"/>
           </p:cNvSpPr>
@@ -38148,15 +37096,15 @@
         </p:nvSpPr>
         <p:spPr>
           <a:xfrm>
-            <a:off x="1127883" y="3941543"/>
-            <a:ext cx="14420850" cy="492588"/>
+            <a:off x="1127883" y="3865329"/>
+            <a:ext cx="14420850" cy="557213"/>
           </a:xfrm>
         </p:spPr>
         <p:txBody>
           <a:bodyPr/>
           <a:lstStyle/>
           <a:p>
-            <a:endParaRPr lang="en-US" dirty="0"/>
+            <a:endParaRPr lang="en-US"/>
           </a:p>
         </p:txBody>
       </p:sp>

</xml_diff>

<commit_message>
minor formatting and docx addition due to publishing
</commit_message>
<xml_diff>
--- a/03-writing_a_test_first.pptx
+++ b/03-writing_a_test_first.pptx
@@ -334,7 +334,7 @@
               <a:pPr>
                 <a:defRPr/>
               </a:pPr>
-              <a:t>2016-02-28</a:t>
+              <a:t>2016-03-01</a:t>
             </a:fld>
             <a:endParaRPr lang="en-US" dirty="0"/>
           </a:p>
@@ -517,7 +517,7 @@
               <a:pPr>
                 <a:defRPr/>
               </a:pPr>
-              <a:t>2016-02-28</a:t>
+              <a:t>2016-03-01</a:t>
             </a:fld>
             <a:endParaRPr lang="en-US" dirty="0"/>
           </a:p>
@@ -1101,15 +1101,7 @@
           <a:p>
             <a:r>
               <a:rPr lang="en-US" dirty="0" smtClean="0"/>
-              <a:t>With the </a:t>
-            </a:r>
-            <a:r>
-              <a:rPr lang="en-US" dirty="0" smtClean="0"/>
-              <a:t>scenario </a:t>
-            </a:r>
-            <a:r>
-              <a:rPr lang="en-US" dirty="0" smtClean="0"/>
-              <a:t>defined it is now time for us to develop the cookbook. We are going to move through the following steps together to accomplish this task.</a:t>
+              <a:t>With the scenario defined it is now time for us to develop the cookbook. We are going to move through the following steps together to accomplish this task.</a:t>
             </a:r>
             <a:endParaRPr lang="en-US" dirty="0"/>
           </a:p>
@@ -1385,23 +1377,7 @@
           <a:p>
             <a:r>
               <a:rPr lang="en-US" baseline="0" dirty="0" smtClean="0"/>
-              <a:t>There are a number of tools installed with the Chef Development Kit (</a:t>
-            </a:r>
-            <a:r>
-              <a:rPr lang="en-US" baseline="0" dirty="0" smtClean="0"/>
-              <a:t>Chef DK</a:t>
-            </a:r>
-            <a:r>
-              <a:rPr lang="en-US" baseline="0" dirty="0" smtClean="0"/>
-              <a:t>). One of those tools included in the </a:t>
-            </a:r>
-            <a:r>
-              <a:rPr lang="en-US" baseline="0" dirty="0" smtClean="0"/>
-              <a:t>Chef DK </a:t>
-            </a:r>
-            <a:r>
-              <a:rPr lang="en-US" baseline="0" dirty="0" smtClean="0"/>
-              <a:t>is a tool called 'chef'. The generators provided with the tool will allow us to quickly generate the a cookbook. You can see help about the command with the '--help' flag.</a:t>
+              <a:t>There are a number of tools installed with the Chef Development Kit (Chef DK). One of those tools included in the Chef DK is a tool called 'chef'. The generators provided with the tool will allow us to quickly generate the a cookbook. You can see help about the command with the '--help' flag.</a:t>
             </a:r>
           </a:p>
           <a:p>
@@ -3394,15 +3370,7 @@
             </a:r>
             <a:r>
               <a:rPr lang="en-US" baseline="0" dirty="0" smtClean="0"/>
-              <a:t> here represents the cookbook name and the </a:t>
-            </a:r>
-            <a:r>
-              <a:rPr lang="en-US" baseline="0" dirty="0" smtClean="0"/>
-              <a:t>suite name</a:t>
-            </a:r>
-            <a:r>
-              <a:rPr lang="en-US" baseline="0" dirty="0" smtClean="0"/>
-              <a:t>. The inner expectation is using a </a:t>
+              <a:t> here represents the cookbook name and the suite name. The inner expectation is using a </a:t>
             </a:r>
             <a:r>
               <a:rPr lang="en-US" baseline="0" dirty="0" err="1" smtClean="0"/>
@@ -3410,15 +3378,7 @@
             </a:r>
             <a:r>
               <a:rPr lang="en-US" baseline="0" dirty="0" smtClean="0"/>
-              <a:t> resource named command. This command resource takes a parameter which is the </a:t>
-            </a:r>
-            <a:r>
-              <a:rPr lang="en-US" baseline="0" dirty="0" smtClean="0"/>
-              <a:t>system command </a:t>
-            </a:r>
-            <a:r>
-              <a:rPr lang="en-US" baseline="0" dirty="0" smtClean="0"/>
-              <a:t>it will run. Within the inner example group we are asking for an attribute on the </a:t>
+              <a:t> resource named command. This command resource takes a parameter which is the system command it will run. Within the inner example group we are asking for an attribute on the </a:t>
             </a:r>
             <a:r>
               <a:rPr lang="en-US" baseline="0" dirty="0" err="1" smtClean="0"/>
@@ -3426,7 +3386,21 @@
             </a:r>
             <a:r>
               <a:rPr lang="en-US" baseline="0" dirty="0" smtClean="0"/>
-              <a:t> command resource. A command resource is one of the few resources that has attributes you can query. In this instance the example is asking for the standard out, abbreviated as '</a:t>
+              <a:t> command resource. </a:t>
+            </a:r>
+            <a:endParaRPr lang="en-US" baseline="0" dirty="0" smtClean="0"/>
+          </a:p>
+          <a:p>
+            <a:endParaRPr lang="en-US" baseline="0" smtClean="0"/>
+          </a:p>
+          <a:p>
+            <a:r>
+              <a:rPr lang="en-US" baseline="0" smtClean="0"/>
+              <a:t>A </a:t>
+            </a:r>
+            <a:r>
+              <a:rPr lang="en-US" baseline="0" dirty="0" smtClean="0"/>
+              <a:t>command resource is one of the few resources that has attributes you can query. In this instance the example is asking for the standard out, abbreviated as '</a:t>
             </a:r>
             <a:r>
               <a:rPr lang="en-US" baseline="0" dirty="0" err="1" smtClean="0"/>
@@ -3434,13 +3408,8 @@
             </a:r>
             <a:r>
               <a:rPr lang="en-US" baseline="0" dirty="0" smtClean="0"/>
-              <a:t>'. Lastly we express an expectation that we expect the actual result returned from the standard out to contain the text 'Welcome Home</a:t>
-            </a:r>
-            <a:r>
-              <a:rPr lang="en-US" baseline="0" dirty="0" smtClean="0"/>
-              <a:t>'.</a:t>
-            </a:r>
-            <a:endParaRPr lang="en-US" baseline="0" dirty="0" smtClean="0"/>
+              <a:t>'. Lastly we express an expectation that we expect the actual result returned from the standard out to contain the text 'Welcome Home'.</a:t>
+            </a:r>
           </a:p>
         </p:txBody>
       </p:sp>
@@ -3580,19 +3549,7 @@
             </a:r>
             <a:r>
               <a:rPr lang="en-US" baseline="0" dirty="0" smtClean="0"/>
-              <a:t> the test file found at the following path you will find that it is already populated </a:t>
-            </a:r>
-            <a:r>
-              <a:rPr lang="en-US" baseline="0" dirty="0" smtClean="0"/>
-              <a:t>with some </a:t>
-            </a:r>
-            <a:r>
-              <a:rPr lang="en-US" baseline="0" dirty="0" smtClean="0"/>
-              <a:t>initial code. The first two lines are comments </a:t>
-            </a:r>
-            <a:r>
-              <a:rPr lang="en-US" baseline="0" dirty="0" smtClean="0"/>
-              <a:t>that provide a link to the </a:t>
+              <a:t> the test file found at the following path you will find that it is already populated with some initial code. The first two lines are comments that provide a link to the </a:t>
             </a:r>
             <a:r>
               <a:rPr lang="en-US" baseline="0" dirty="0" err="1" smtClean="0"/>
@@ -3600,30 +3557,17 @@
             </a:r>
             <a:r>
               <a:rPr lang="en-US" baseline="0" dirty="0" smtClean="0"/>
-              <a:t> </a:t>
-            </a:r>
+              <a:t> documentation. The next three lines are a placeholder test that when executed notifies you that this test is skipped.</a:t>
+            </a:r>
+          </a:p>
+          <a:p>
+            <a:endParaRPr lang="en-US" baseline="0" dirty="0" smtClean="0"/>
+          </a:p>
+          <a:p>
             <a:r>
               <a:rPr lang="en-US" baseline="0" dirty="0" smtClean="0"/>
-              <a:t>documentation. The </a:t>
-            </a:r>
-            <a:r>
-              <a:rPr lang="en-US" baseline="0" dirty="0" smtClean="0"/>
-              <a:t>next three lines are a placeholder test that when executed notifies you that this test is skipped.</a:t>
-            </a:r>
-          </a:p>
-          <a:p>
-            <a:endParaRPr lang="en-US" baseline="0" dirty="0" smtClean="0"/>
-          </a:p>
-          <a:p>
-            <a:r>
-              <a:rPr lang="en-US" baseline="0" dirty="0" smtClean="0"/>
-              <a:t>We do not need these comments or the placeholder test so let's remove it from the </a:t>
-            </a:r>
-            <a:r>
-              <a:rPr lang="en-US" baseline="0" dirty="0" smtClean="0"/>
-              <a:t>specification.</a:t>
-            </a:r>
-            <a:endParaRPr lang="en-US" baseline="0" dirty="0" smtClean="0"/>
+              <a:t>We do not need these comments or the placeholder test so let's remove it from the specification.</a:t>
+            </a:r>
           </a:p>
         </p:txBody>
       </p:sp>
@@ -4060,19 +4004,7 @@
             </a:r>
             <a:r>
               <a:rPr lang="en-US" baseline="0" dirty="0" smtClean="0"/>
-              <a:t> execute our tests using the tool Test </a:t>
-            </a:r>
-            <a:r>
-              <a:rPr lang="en-US" baseline="0" dirty="0" smtClean="0"/>
-              <a:t>Kitchen </a:t>
-            </a:r>
-            <a:r>
-              <a:rPr lang="en-US" baseline="0" dirty="0" smtClean="0"/>
-              <a:t>we need to be within the directory of the cookbook</a:t>
-            </a:r>
-            <a:r>
-              <a:rPr lang="en-US" baseline="0" dirty="0" smtClean="0"/>
-              <a:t>.</a:t>
+              <a:t> execute our tests using the tool Test Kitchen we need to be within the directory of the cookbook.</a:t>
             </a:r>
             <a:endParaRPr lang="en-US" dirty="0"/>
           </a:p>
@@ -7040,15 +6972,7 @@
             </a:r>
             <a:r>
               <a:rPr lang="en-US" baseline="0" dirty="0" smtClean="0"/>
-              <a:t> the platform or assist with troubleshooting your recipes they fail in perplexing ways. Right now, we are interested in </a:t>
-            </a:r>
-            <a:r>
-              <a:rPr lang="en-US" baseline="0" dirty="0" smtClean="0"/>
-              <a:t>executing the tests </a:t>
-            </a:r>
-            <a:r>
-              <a:rPr lang="en-US" baseline="0" dirty="0" smtClean="0"/>
-              <a:t>so logout of the instance with the 'exit' command and we will return to the workstation.</a:t>
+              <a:t> the platform or assist with troubleshooting your recipes they fail in perplexing ways. Right now, we are interested in executing the tests so logout of the instance with the 'exit' command and we will return to the workstation.</a:t>
             </a:r>
             <a:endParaRPr lang="en-US" dirty="0"/>
           </a:p>
@@ -9182,15 +9106,7 @@
           <a:p>
             <a:r>
               <a:rPr lang="en-US" baseline="0" dirty="0" smtClean="0"/>
-              <a:t>If it </a:t>
-            </a:r>
-            <a:r>
-              <a:rPr lang="en-US" baseline="0" dirty="0" smtClean="0"/>
-              <a:t>does fail, </a:t>
-            </a:r>
-            <a:r>
-              <a:rPr lang="en-US" baseline="0" dirty="0" smtClean="0"/>
-              <a:t>it is time to review the code you wrote in the recipe file and the spec file. When it was failing did you get a different failure than the one that we walked through? That probably means there is an error in the spec file. Did the test instance actually converge successfully? Sometimes output will scroll by and we don't have time to read it. I get it. Scroll back up and see if there was an error message tucked into the 'kitchen converge' you ran.</a:t>
+              <a:t>If it does fail, it is time to review the code you wrote in the recipe file and the spec file. When it was failing did you get a different failure than the one that we walked through? That probably means there is an error in the spec file. Did the test instance actually converge successfully? Sometimes output will scroll by and we don't have time to read it. I get it. Scroll back up and see if there was an error message tucked into the 'kitchen converge' you ran.</a:t>
             </a:r>
             <a:endParaRPr lang="en-US" dirty="0"/>
           </a:p>
@@ -9345,11 +9261,7 @@
             </a:r>
             <a:r>
               <a:rPr lang="en-US" baseline="0" smtClean="0"/>
-              <a:t>an </a:t>
-            </a:r>
-            <a:r>
-              <a:rPr lang="en-US" baseline="0" smtClean="0"/>
-              <a:t>expectation in </a:t>
+              <a:t>an expectation in </a:t>
             </a:r>
             <a:r>
               <a:rPr lang="en-US" baseline="0" dirty="0" smtClean="0"/>
@@ -11122,14 +11034,14 @@
           </a:ln>
           <a:extLst>
             <a:ext uri="{909E8E84-426E-40dd-AFC4-6F175D3DCCD1}">
-              <a14:hiddenFill xmlns="" xmlns:a14="http://schemas.microsoft.com/office/drawing/2010/main">
+              <a14:hiddenFill xmlns:a14="http://schemas.microsoft.com/office/drawing/2010/main" xmlns="">
                 <a:solidFill>
                   <a:srgbClr val="FFFFFF"/>
                 </a:solidFill>
               </a14:hiddenFill>
             </a:ext>
             <a:ext uri="{91240B29-F687-4f45-9708-019B960494DF}">
-              <a14:hiddenLine xmlns="" xmlns:a14="http://schemas.microsoft.com/office/drawing/2010/main" w="9525">
+              <a14:hiddenLine xmlns:a14="http://schemas.microsoft.com/office/drawing/2010/main" xmlns="" w="9525">
                 <a:solidFill>
                   <a:srgbClr val="000000"/>
                 </a:solidFill>
@@ -11277,14 +11189,14 @@
           </a:ln>
           <a:extLst>
             <a:ext uri="{909E8E84-426E-40dd-AFC4-6F175D3DCCD1}">
-              <a14:hiddenFill xmlns="" xmlns:a14="http://schemas.microsoft.com/office/drawing/2010/main">
+              <a14:hiddenFill xmlns:a14="http://schemas.microsoft.com/office/drawing/2010/main" xmlns="">
                 <a:solidFill>
                   <a:srgbClr val="FFFFFF"/>
                 </a:solidFill>
               </a14:hiddenFill>
             </a:ext>
             <a:ext uri="{91240B29-F687-4f45-9708-019B960494DF}">
-              <a14:hiddenLine xmlns="" xmlns:a14="http://schemas.microsoft.com/office/drawing/2010/main" w="9525">
+              <a14:hiddenLine xmlns:a14="http://schemas.microsoft.com/office/drawing/2010/main" xmlns="" w="9525">
                 <a:solidFill>
                   <a:srgbClr val="000000"/>
                 </a:solidFill>
@@ -11775,14 +11687,14 @@
           </a:ln>
           <a:extLst>
             <a:ext uri="{909E8E84-426E-40dd-AFC4-6F175D3DCCD1}">
-              <a14:hiddenFill xmlns="" xmlns:a14="http://schemas.microsoft.com/office/drawing/2010/main">
+              <a14:hiddenFill xmlns:a14="http://schemas.microsoft.com/office/drawing/2010/main" xmlns="">
                 <a:solidFill>
                   <a:srgbClr val="FFFFFF"/>
                 </a:solidFill>
               </a14:hiddenFill>
             </a:ext>
             <a:ext uri="{91240B29-F687-4f45-9708-019B960494DF}">
-              <a14:hiddenLine xmlns="" xmlns:a14="http://schemas.microsoft.com/office/drawing/2010/main" w="9525">
+              <a14:hiddenLine xmlns:a14="http://schemas.microsoft.com/office/drawing/2010/main" xmlns="" w="9525">
                 <a:solidFill>
                   <a:srgbClr val="000000"/>
                 </a:solidFill>
@@ -13231,14 +13143,14 @@
           </a:ln>
           <a:extLst>
             <a:ext uri="{909E8E84-426E-40dd-AFC4-6F175D3DCCD1}">
-              <a14:hiddenFill xmlns="" xmlns:a14="http://schemas.microsoft.com/office/drawing/2010/main">
+              <a14:hiddenFill xmlns:a14="http://schemas.microsoft.com/office/drawing/2010/main" xmlns="">
                 <a:solidFill>
                   <a:srgbClr val="FFFFFF"/>
                 </a:solidFill>
               </a14:hiddenFill>
             </a:ext>
             <a:ext uri="{91240B29-F687-4f45-9708-019B960494DF}">
-              <a14:hiddenLine xmlns="" xmlns:a14="http://schemas.microsoft.com/office/drawing/2010/main" w="9525">
+              <a14:hiddenLine xmlns:a14="http://schemas.microsoft.com/office/drawing/2010/main" xmlns="" w="9525">
                 <a:solidFill>
                   <a:srgbClr val="000000"/>
                 </a:solidFill>
@@ -14592,14 +14504,14 @@
           </a:ln>
           <a:extLst>
             <a:ext uri="{909E8E84-426E-40dd-AFC4-6F175D3DCCD1}">
-              <a14:hiddenFill xmlns="" xmlns:a14="http://schemas.microsoft.com/office/drawing/2010/main">
+              <a14:hiddenFill xmlns:a14="http://schemas.microsoft.com/office/drawing/2010/main" xmlns="">
                 <a:solidFill>
                   <a:srgbClr val="FFFFFF"/>
                 </a:solidFill>
               </a14:hiddenFill>
             </a:ext>
             <a:ext uri="{91240B29-F687-4f45-9708-019B960494DF}">
-              <a14:hiddenLine xmlns="" xmlns:a14="http://schemas.microsoft.com/office/drawing/2010/main" w="9525">
+              <a14:hiddenLine xmlns:a14="http://schemas.microsoft.com/office/drawing/2010/main" xmlns="" w="9525">
                 <a:solidFill>
                   <a:srgbClr val="000000"/>
                 </a:solidFill>
@@ -15157,14 +15069,14 @@
           </a:ln>
           <a:extLst>
             <a:ext uri="{909E8E84-426E-40dd-AFC4-6F175D3DCCD1}">
-              <a14:hiddenFill xmlns="" xmlns:a14="http://schemas.microsoft.com/office/drawing/2010/main">
+              <a14:hiddenFill xmlns:a14="http://schemas.microsoft.com/office/drawing/2010/main" xmlns="">
                 <a:solidFill>
                   <a:srgbClr val="FFFFFF"/>
                 </a:solidFill>
               </a14:hiddenFill>
             </a:ext>
             <a:ext uri="{91240B29-F687-4f45-9708-019B960494DF}">
-              <a14:hiddenLine xmlns="" xmlns:a14="http://schemas.microsoft.com/office/drawing/2010/main" w="9525">
+              <a14:hiddenLine xmlns:a14="http://schemas.microsoft.com/office/drawing/2010/main" xmlns="" w="9525">
                 <a:solidFill>
                   <a:srgbClr val="000000"/>
                 </a:solidFill>
@@ -15731,14 +15643,14 @@
           </a:ln>
           <a:extLst>
             <a:ext uri="{909E8E84-426E-40dd-AFC4-6F175D3DCCD1}">
-              <a14:hiddenFill xmlns="" xmlns:a14="http://schemas.microsoft.com/office/drawing/2010/main">
+              <a14:hiddenFill xmlns:a14="http://schemas.microsoft.com/office/drawing/2010/main" xmlns="">
                 <a:solidFill>
                   <a:srgbClr val="FFFFFF"/>
                 </a:solidFill>
               </a14:hiddenFill>
             </a:ext>
             <a:ext uri="{91240B29-F687-4f45-9708-019B960494DF}">
-              <a14:hiddenLine xmlns="" xmlns:a14="http://schemas.microsoft.com/office/drawing/2010/main" w="9525">
+              <a14:hiddenLine xmlns:a14="http://schemas.microsoft.com/office/drawing/2010/main" xmlns="" w="9525">
                 <a:solidFill>
                   <a:srgbClr val="000000"/>
                 </a:solidFill>
@@ -16678,14 +16590,14 @@
           </a:ln>
           <a:extLst>
             <a:ext uri="{909E8E84-426E-40dd-AFC4-6F175D3DCCD1}">
-              <a14:hiddenFill xmlns="" xmlns:a14="http://schemas.microsoft.com/office/drawing/2010/main">
+              <a14:hiddenFill xmlns:a14="http://schemas.microsoft.com/office/drawing/2010/main" xmlns="">
                 <a:solidFill>
                   <a:srgbClr val="FFFFFF"/>
                 </a:solidFill>
               </a14:hiddenFill>
             </a:ext>
             <a:ext uri="{91240B29-F687-4f45-9708-019B960494DF}">
-              <a14:hiddenLine xmlns="" xmlns:a14="http://schemas.microsoft.com/office/drawing/2010/main" w="9525">
+              <a14:hiddenLine xmlns:a14="http://schemas.microsoft.com/office/drawing/2010/main" xmlns="" w="9525">
                 <a:solidFill>
                   <a:srgbClr val="000000"/>
                 </a:solidFill>
@@ -17458,14 +17370,14 @@
           </a:ln>
           <a:extLst>
             <a:ext uri="{909E8E84-426E-40dd-AFC4-6F175D3DCCD1}">
-              <a14:hiddenFill xmlns="" xmlns:a14="http://schemas.microsoft.com/office/drawing/2010/main">
+              <a14:hiddenFill xmlns:a14="http://schemas.microsoft.com/office/drawing/2010/main" xmlns="">
                 <a:solidFill>
                   <a:srgbClr val="FFFFFF"/>
                 </a:solidFill>
               </a14:hiddenFill>
             </a:ext>
             <a:ext uri="{91240B29-F687-4f45-9708-019B960494DF}">
-              <a14:hiddenLine xmlns="" xmlns:a14="http://schemas.microsoft.com/office/drawing/2010/main" w="9525">
+              <a14:hiddenLine xmlns:a14="http://schemas.microsoft.com/office/drawing/2010/main" xmlns="" w="9525">
                 <a:solidFill>
                   <a:srgbClr val="000000"/>
                 </a:solidFill>
@@ -29448,7 +29360,6 @@
               <a:rPr lang="en-US" sz="3200" dirty="0"/>
               <a:t>influences the language we use to write tests and how we focus on the tests that matter.</a:t>
             </a:r>
-            <a:endParaRPr lang="en-US" sz="3200" dirty="0"/>
           </a:p>
         </p:txBody>
       </p:sp>
@@ -40070,52 +39981,6 @@
 
 <file path=customXml/item1.xml><?xml version="1.0" encoding="utf-8"?>
 <?mso-contentType ?>
-<spe:Receivers xmlns:spe="http://schemas.microsoft.com/sharepoint/events">
-  <Receiver>
-    <Name>Document ID Generator</Name>
-    <Synchronization>Synchronous</Synchronization>
-    <Type>10001</Type>
-    <SequenceNumber>1000</SequenceNumber>
-    <Assembly>Microsoft.Office.DocumentManagement, Version=14.0.0.0, Culture=neutral, PublicKeyToken=71e9bce111e9429c</Assembly>
-    <Class>Microsoft.Office.DocumentManagement.Internal.DocIdHandler</Class>
-    <Data/>
-    <Filter/>
-  </Receiver>
-  <Receiver>
-    <Name>Document ID Generator</Name>
-    <Synchronization>Synchronous</Synchronization>
-    <Type>10002</Type>
-    <SequenceNumber>1001</SequenceNumber>
-    <Assembly>Microsoft.Office.DocumentManagement, Version=14.0.0.0, Culture=neutral, PublicKeyToken=71e9bce111e9429c</Assembly>
-    <Class>Microsoft.Office.DocumentManagement.Internal.DocIdHandler</Class>
-    <Data/>
-    <Filter/>
-  </Receiver>
-  <Receiver>
-    <Name>Document ID Generator</Name>
-    <Synchronization>Synchronous</Synchronization>
-    <Type>10004</Type>
-    <SequenceNumber>1002</SequenceNumber>
-    <Assembly>Microsoft.Office.DocumentManagement, Version=14.0.0.0, Culture=neutral, PublicKeyToken=71e9bce111e9429c</Assembly>
-    <Class>Microsoft.Office.DocumentManagement.Internal.DocIdHandler</Class>
-    <Data/>
-    <Filter/>
-  </Receiver>
-  <Receiver>
-    <Name>Document ID Generator</Name>
-    <Synchronization>Synchronous</Synchronization>
-    <Type>10006</Type>
-    <SequenceNumber>1003</SequenceNumber>
-    <Assembly>Microsoft.Office.DocumentManagement, Version=14.0.0.0, Culture=neutral, PublicKeyToken=71e9bce111e9429c</Assembly>
-    <Class>Microsoft.Office.DocumentManagement.Internal.DocIdHandler</Class>
-    <Data/>
-    <Filter/>
-  </Receiver>
-</spe:Receivers>
-</file>
-
-<file path=customXml/item2.xml><?xml version="1.0" encoding="utf-8"?>
-<?mso-contentType ?>
 <FormTemplates xmlns="http://schemas.microsoft.com/sharepoint/v3/contenttype/forms">
   <Display>DocumentLibraryForm</Display>
   <Edit>DocumentLibraryForm</Edit>
@@ -40123,19 +39988,7 @@
 </FormTemplates>
 </file>
 
-<file path=customXml/item3.xml><?xml version="1.0" encoding="utf-8"?>
-<p:properties xmlns:p="http://schemas.microsoft.com/office/2006/metadata/properties" xmlns:xsi="http://www.w3.org/2001/XMLSchema-instance" xmlns:pc="http://schemas.microsoft.com/office/infopath/2007/PartnerControls">
-  <documentManagement>
-    <_dlc_DocId xmlns="7bb5d761-a2ea-4873-95f7-7a6658fb3ef0">M4CWTKMW727E-592-73</_dlc_DocId>
-    <_dlc_DocIdUrl xmlns="7bb5d761-a2ea-4873-95f7-7a6658fb3ef0">
-      <Url>https://kms.vci.local/marketing/team/_layouts/DocIdRedir.aspx?ID=M4CWTKMW727E-592-73</Url>
-      <Description>M4CWTKMW727E-592-73</Description>
-    </_dlc_DocIdUrl>
-  </documentManagement>
-</p:properties>
-</file>
-
-<file path=customXml/item4.xml><?xml version="1.0" encoding="utf-8"?>
+<file path=customXml/item2.xml><?xml version="1.0" encoding="utf-8"?>
 <ct:contentTypeSchema xmlns:ct="http://schemas.microsoft.com/office/2006/metadata/contentType" xmlns:ma="http://schemas.microsoft.com/office/2006/metadata/properties/metaAttributes" ct:_="" ma:_="" ma:contentTypeName="Document" ma:contentTypeID="0x0101000812F700BE7F874999720E88173FE491" ma:contentTypeVersion="0" ma:contentTypeDescription="Create a new document." ma:contentTypeScope="" ma:versionID="3f79f408e2ca720b7aba6e0e32464d0c">
   <xsd:schema xmlns:xsd="http://www.w3.org/2001/XMLSchema" xmlns:xs="http://www.w3.org/2001/XMLSchema" xmlns:p="http://schemas.microsoft.com/office/2006/metadata/properties" xmlns:ns2="7bb5d761-a2ea-4873-95f7-7a6658fb3ef0" targetNamespace="http://schemas.microsoft.com/office/2006/metadata/properties" ma:root="true" ma:fieldsID="1e062cd38ba31e406bfc4340fbc7f87a" ns2:_="">
     <xsd:import namespace="7bb5d761-a2ea-4873-95f7-7a6658fb3ef0"/>
@@ -40280,15 +40133,65 @@
 </ct:contentTypeSchema>
 </file>
 
-<file path=customXml/itemProps1.xml><?xml version="1.0" encoding="utf-8"?>
-<ds:datastoreItem xmlns:ds="http://schemas.openxmlformats.org/officeDocument/2006/customXml" ds:itemID="{B13EBC30-FE27-4C6A-B723-23FC2188F7DC}">
-  <ds:schemaRefs>
-    <ds:schemaRef ds:uri="http://schemas.microsoft.com/sharepoint/events"/>
-  </ds:schemaRefs>
-</ds:datastoreItem>
+<file path=customXml/item3.xml><?xml version="1.0" encoding="utf-8"?>
+<p:properties xmlns:p="http://schemas.microsoft.com/office/2006/metadata/properties" xmlns:xsi="http://www.w3.org/2001/XMLSchema-instance" xmlns:pc="http://schemas.microsoft.com/office/infopath/2007/PartnerControls">
+  <documentManagement>
+    <_dlc_DocId xmlns="7bb5d761-a2ea-4873-95f7-7a6658fb3ef0">M4CWTKMW727E-592-73</_dlc_DocId>
+    <_dlc_DocIdUrl xmlns="7bb5d761-a2ea-4873-95f7-7a6658fb3ef0">
+      <Url>https://kms.vci.local/marketing/team/_layouts/DocIdRedir.aspx?ID=M4CWTKMW727E-592-73</Url>
+      <Description>M4CWTKMW727E-592-73</Description>
+    </_dlc_DocIdUrl>
+  </documentManagement>
+</p:properties>
 </file>
 
-<file path=customXml/itemProps2.xml><?xml version="1.0" encoding="utf-8"?>
+<file path=customXml/item4.xml><?xml version="1.0" encoding="utf-8"?>
+<?mso-contentType ?>
+<spe:Receivers xmlns:spe="http://schemas.microsoft.com/sharepoint/events">
+  <Receiver>
+    <Name>Document ID Generator</Name>
+    <Synchronization>Synchronous</Synchronization>
+    <Type>10001</Type>
+    <SequenceNumber>1000</SequenceNumber>
+    <Assembly>Microsoft.Office.DocumentManagement, Version=14.0.0.0, Culture=neutral, PublicKeyToken=71e9bce111e9429c</Assembly>
+    <Class>Microsoft.Office.DocumentManagement.Internal.DocIdHandler</Class>
+    <Data/>
+    <Filter/>
+  </Receiver>
+  <Receiver>
+    <Name>Document ID Generator</Name>
+    <Synchronization>Synchronous</Synchronization>
+    <Type>10002</Type>
+    <SequenceNumber>1001</SequenceNumber>
+    <Assembly>Microsoft.Office.DocumentManagement, Version=14.0.0.0, Culture=neutral, PublicKeyToken=71e9bce111e9429c</Assembly>
+    <Class>Microsoft.Office.DocumentManagement.Internal.DocIdHandler</Class>
+    <Data/>
+    <Filter/>
+  </Receiver>
+  <Receiver>
+    <Name>Document ID Generator</Name>
+    <Synchronization>Synchronous</Synchronization>
+    <Type>10004</Type>
+    <SequenceNumber>1002</SequenceNumber>
+    <Assembly>Microsoft.Office.DocumentManagement, Version=14.0.0.0, Culture=neutral, PublicKeyToken=71e9bce111e9429c</Assembly>
+    <Class>Microsoft.Office.DocumentManagement.Internal.DocIdHandler</Class>
+    <Data/>
+    <Filter/>
+  </Receiver>
+  <Receiver>
+    <Name>Document ID Generator</Name>
+    <Synchronization>Synchronous</Synchronization>
+    <Type>10006</Type>
+    <SequenceNumber>1003</SequenceNumber>
+    <Assembly>Microsoft.Office.DocumentManagement, Version=14.0.0.0, Culture=neutral, PublicKeyToken=71e9bce111e9429c</Assembly>
+    <Class>Microsoft.Office.DocumentManagement.Internal.DocIdHandler</Class>
+    <Data/>
+    <Filter/>
+  </Receiver>
+</spe:Receivers>
+</file>
+
+<file path=customXml/itemProps1.xml><?xml version="1.0" encoding="utf-8"?>
 <ds:datastoreItem xmlns:ds="http://schemas.openxmlformats.org/officeDocument/2006/customXml" ds:itemID="{5CDEB364-43EC-4510-9881-539C2A3FCE9E}">
   <ds:schemaRefs>
     <ds:schemaRef ds:uri="http://schemas.microsoft.com/sharepoint/v3/contenttype/forms"/>
@@ -40296,23 +40199,7 @@
 </ds:datastoreItem>
 </file>
 
-<file path=customXml/itemProps3.xml><?xml version="1.0" encoding="utf-8"?>
-<ds:datastoreItem xmlns:ds="http://schemas.openxmlformats.org/officeDocument/2006/customXml" ds:itemID="{6921749B-AEB7-461B-845F-603CABD25259}">
-  <ds:schemaRefs>
-    <ds:schemaRef ds:uri="7bb5d761-a2ea-4873-95f7-7a6658fb3ef0"/>
-    <ds:schemaRef ds:uri="http://purl.org/dc/terms/"/>
-    <ds:schemaRef ds:uri="http://schemas.openxmlformats.org/package/2006/metadata/core-properties"/>
-    <ds:schemaRef ds:uri="http://purl.org/dc/dcmitype/"/>
-    <ds:schemaRef ds:uri="http://schemas.microsoft.com/office/2006/documentManagement/types"/>
-    <ds:schemaRef ds:uri="http://purl.org/dc/elements/1.1/"/>
-    <ds:schemaRef ds:uri="http://schemas.microsoft.com/office/2006/metadata/properties"/>
-    <ds:schemaRef ds:uri="http://schemas.microsoft.com/office/infopath/2007/PartnerControls"/>
-    <ds:schemaRef ds:uri="http://www.w3.org/XML/1998/namespace"/>
-  </ds:schemaRefs>
-</ds:datastoreItem>
-</file>
-
-<file path=customXml/itemProps4.xml><?xml version="1.0" encoding="utf-8"?>
+<file path=customXml/itemProps2.xml><?xml version="1.0" encoding="utf-8"?>
 <ds:datastoreItem xmlns:ds="http://schemas.openxmlformats.org/officeDocument/2006/customXml" ds:itemID="{164479E5-0B02-49AC-B79E-EC1D6164DDD3}">
   <ds:schemaRefs>
     <ds:schemaRef ds:uri="http://schemas.microsoft.com/office/2006/metadata/contentType"/>
@@ -40328,4 +40215,28 @@
     <ds:schemaRef ds:uri="http://schemas.microsoft.com/internal/obd"/>
   </ds:schemaRefs>
 </ds:datastoreItem>
+</file>
+
+<file path=customXml/itemProps3.xml><?xml version="1.0" encoding="utf-8"?>
+<ds:datastoreItem xmlns:ds="http://schemas.openxmlformats.org/officeDocument/2006/customXml" ds:itemID="{6921749B-AEB7-461B-845F-603CABD25259}">
+  <ds:schemaRefs>
+    <ds:schemaRef ds:uri="7bb5d761-a2ea-4873-95f7-7a6658fb3ef0"/>
+    <ds:schemaRef ds:uri="http://purl.org/dc/terms/"/>
+    <ds:schemaRef ds:uri="http://schemas.openxmlformats.org/package/2006/metadata/core-properties"/>
+    <ds:schemaRef ds:uri="http://purl.org/dc/dcmitype/"/>
+    <ds:schemaRef ds:uri="http://schemas.microsoft.com/office/infopath/2007/PartnerControls"/>
+    <ds:schemaRef ds:uri="http://schemas.microsoft.com/office/2006/documentManagement/types"/>
+    <ds:schemaRef ds:uri="http://purl.org/dc/elements/1.1/"/>
+    <ds:schemaRef ds:uri="http://schemas.microsoft.com/office/2006/metadata/properties"/>
+    <ds:schemaRef ds:uri="http://www.w3.org/XML/1998/namespace"/>
+  </ds:schemaRefs>
+</ds:datastoreItem>
+</file>
+
+<file path=customXml/itemProps4.xml><?xml version="1.0" encoding="utf-8"?>
+<ds:datastoreItem xmlns:ds="http://schemas.openxmlformats.org/officeDocument/2006/customXml" ds:itemID="{B13EBC30-FE27-4C6A-B723-23FC2188F7DC}">
+  <ds:schemaRefs>
+    <ds:schemaRef ds:uri="http://schemas.microsoft.com/sharepoint/events"/>
+  </ds:schemaRefs>
+</ds:datastoreItem>
 </file>
</xml_diff>